<commit_message>
Update dataset references and statistics
Original Comment:
"Comment n.7 International English  language standards in references

Reference n.7 continue to be a spanish language reference, instead of an international and English one, as required by this kind of publication."

Solution:
Revised the manuscript to reflect the use of three academic datasets instead of four for the unified Spanish fake news corpus. Updated corpus statistics, removed references to the Acosta dataset, adjusted the comparative table, removed the mention of the Acosta corpus from Figure 1, and renumbered bibliography entries accordingly.
</commit_message>
<xml_diff>
--- a/MDPI_template/MDPI_template/Figures/figura1.pptx
+++ b/MDPI_template/MDPI_template/Figures/figura1.pptx
@@ -12,7 +12,8 @@
     <p:sldId id="263" r:id="rId6"/>
     <p:sldId id="264" r:id="rId7"/>
     <p:sldId id="258" r:id="rId8"/>
-    <p:sldId id="259" r:id="rId9"/>
+    <p:sldId id="265" r:id="rId9"/>
+    <p:sldId id="259" r:id="rId10"/>
   </p:sldIdLst>
   <p:sldSz cx="12192000" cy="6858000"/>
   <p:notesSz cx="6858000" cy="9144000"/>
@@ -268,7 +269,7 @@
           <a:p>
             <a:fld id="{B904A2E9-BBCF-4A5B-B40D-97E4A029EF02}" type="datetimeFigureOut">
               <a:rPr lang="es-MX" smtClean="0"/>
-              <a:t>14/10/2025</a:t>
+              <a:t>24/12/2025</a:t>
             </a:fld>
             <a:endParaRPr lang="es-MX"/>
           </a:p>
@@ -468,7 +469,7 @@
           <a:p>
             <a:fld id="{B904A2E9-BBCF-4A5B-B40D-97E4A029EF02}" type="datetimeFigureOut">
               <a:rPr lang="es-MX" smtClean="0"/>
-              <a:t>14/10/2025</a:t>
+              <a:t>24/12/2025</a:t>
             </a:fld>
             <a:endParaRPr lang="es-MX"/>
           </a:p>
@@ -678,7 +679,7 @@
           <a:p>
             <a:fld id="{B904A2E9-BBCF-4A5B-B40D-97E4A029EF02}" type="datetimeFigureOut">
               <a:rPr lang="es-MX" smtClean="0"/>
-              <a:t>14/10/2025</a:t>
+              <a:t>24/12/2025</a:t>
             </a:fld>
             <a:endParaRPr lang="es-MX"/>
           </a:p>
@@ -878,7 +879,7 @@
           <a:p>
             <a:fld id="{B904A2E9-BBCF-4A5B-B40D-97E4A029EF02}" type="datetimeFigureOut">
               <a:rPr lang="es-MX" smtClean="0"/>
-              <a:t>14/10/2025</a:t>
+              <a:t>24/12/2025</a:t>
             </a:fld>
             <a:endParaRPr lang="es-MX"/>
           </a:p>
@@ -1154,7 +1155,7 @@
           <a:p>
             <a:fld id="{B904A2E9-BBCF-4A5B-B40D-97E4A029EF02}" type="datetimeFigureOut">
               <a:rPr lang="es-MX" smtClean="0"/>
-              <a:t>14/10/2025</a:t>
+              <a:t>24/12/2025</a:t>
             </a:fld>
             <a:endParaRPr lang="es-MX"/>
           </a:p>
@@ -1422,7 +1423,7 @@
           <a:p>
             <a:fld id="{B904A2E9-BBCF-4A5B-B40D-97E4A029EF02}" type="datetimeFigureOut">
               <a:rPr lang="es-MX" smtClean="0"/>
-              <a:t>14/10/2025</a:t>
+              <a:t>24/12/2025</a:t>
             </a:fld>
             <a:endParaRPr lang="es-MX"/>
           </a:p>
@@ -1837,7 +1838,7 @@
           <a:p>
             <a:fld id="{B904A2E9-BBCF-4A5B-B40D-97E4A029EF02}" type="datetimeFigureOut">
               <a:rPr lang="es-MX" smtClean="0"/>
-              <a:t>14/10/2025</a:t>
+              <a:t>24/12/2025</a:t>
             </a:fld>
             <a:endParaRPr lang="es-MX"/>
           </a:p>
@@ -1979,7 +1980,7 @@
           <a:p>
             <a:fld id="{B904A2E9-BBCF-4A5B-B40D-97E4A029EF02}" type="datetimeFigureOut">
               <a:rPr lang="es-MX" smtClean="0"/>
-              <a:t>14/10/2025</a:t>
+              <a:t>24/12/2025</a:t>
             </a:fld>
             <a:endParaRPr lang="es-MX"/>
           </a:p>
@@ -2092,7 +2093,7 @@
           <a:p>
             <a:fld id="{B904A2E9-BBCF-4A5B-B40D-97E4A029EF02}" type="datetimeFigureOut">
               <a:rPr lang="es-MX" smtClean="0"/>
-              <a:t>14/10/2025</a:t>
+              <a:t>24/12/2025</a:t>
             </a:fld>
             <a:endParaRPr lang="es-MX"/>
           </a:p>
@@ -2405,7 +2406,7 @@
           <a:p>
             <a:fld id="{B904A2E9-BBCF-4A5B-B40D-97E4A029EF02}" type="datetimeFigureOut">
               <a:rPr lang="es-MX" smtClean="0"/>
-              <a:t>14/10/2025</a:t>
+              <a:t>24/12/2025</a:t>
             </a:fld>
             <a:endParaRPr lang="es-MX"/>
           </a:p>
@@ -2694,7 +2695,7 @@
           <a:p>
             <a:fld id="{B904A2E9-BBCF-4A5B-B40D-97E4A029EF02}" type="datetimeFigureOut">
               <a:rPr lang="es-MX" smtClean="0"/>
-              <a:t>14/10/2025</a:t>
+              <a:t>24/12/2025</a:t>
             </a:fld>
             <a:endParaRPr lang="es-MX"/>
           </a:p>
@@ -2937,7 +2938,7 @@
           <a:p>
             <a:fld id="{B904A2E9-BBCF-4A5B-B40D-97E4A029EF02}" type="datetimeFigureOut">
               <a:rPr lang="es-MX" smtClean="0"/>
-              <a:t>14/10/2025</a:t>
+              <a:t>24/12/2025</a:t>
             </a:fld>
             <a:endParaRPr lang="es-MX"/>
           </a:p>
@@ -12436,6 +12437,1720 @@
           <a:chExt cx="0" cy="0"/>
         </a:xfrm>
       </p:grpSpPr>
+      <p:pic>
+        <p:nvPicPr>
+          <p:cNvPr id="7" name="Imagen 6">
+            <a:extLst>
+              <a:ext uri="{FF2B5EF4-FFF2-40B4-BE49-F238E27FC236}">
+                <a16:creationId xmlns:a16="http://schemas.microsoft.com/office/drawing/2014/main" id="{1F59BC40-0591-4675-9CCB-D55648AE021F}"/>
+              </a:ext>
+            </a:extLst>
+          </p:cNvPr>
+          <p:cNvPicPr>
+            <a:picLocks noChangeAspect="1"/>
+          </p:cNvPicPr>
+          <p:nvPr/>
+        </p:nvPicPr>
+        <p:blipFill rotWithShape="1">
+          <a:blip r:embed="rId2"/>
+          <a:srcRect t="8982" b="8159"/>
+          <a:stretch/>
+        </p:blipFill>
+        <p:spPr>
+          <a:xfrm>
+            <a:off x="164774" y="93290"/>
+            <a:ext cx="5541335" cy="3638762"/>
+          </a:xfrm>
+          <a:prstGeom prst="rect">
+            <a:avLst/>
+          </a:prstGeom>
+          <a:ln>
+            <a:solidFill>
+              <a:schemeClr val="accent1"/>
+            </a:solidFill>
+          </a:ln>
+        </p:spPr>
+      </p:pic>
+      <p:pic>
+        <p:nvPicPr>
+          <p:cNvPr id="54" name="Imagen 53">
+            <a:extLst>
+              <a:ext uri="{FF2B5EF4-FFF2-40B4-BE49-F238E27FC236}">
+                <a16:creationId xmlns:a16="http://schemas.microsoft.com/office/drawing/2014/main" id="{B8582416-C696-4470-83CE-D87FDB6FC5DF}"/>
+              </a:ext>
+            </a:extLst>
+          </p:cNvPr>
+          <p:cNvPicPr>
+            <a:picLocks noChangeAspect="1"/>
+          </p:cNvPicPr>
+          <p:nvPr/>
+        </p:nvPicPr>
+        <p:blipFill rotWithShape="1">
+          <a:blip r:embed="rId3">
+            <a:extLst>
+              <a:ext uri="{28A0092B-C50C-407E-A947-70E740481C1C}">
+                <a14:useLocalDpi xmlns:a14="http://schemas.microsoft.com/office/drawing/2010/main" val="0"/>
+              </a:ext>
+            </a:extLst>
+          </a:blip>
+          <a:srcRect l="25675" r="28633"/>
+          <a:stretch/>
+        </p:blipFill>
+        <p:spPr>
+          <a:xfrm>
+            <a:off x="6526559" y="14269"/>
+            <a:ext cx="5072688" cy="6843731"/>
+          </a:xfrm>
+          <a:prstGeom prst="rect">
+            <a:avLst/>
+          </a:prstGeom>
+          <a:ln>
+            <a:solidFill>
+              <a:schemeClr val="accent1"/>
+            </a:solidFill>
+          </a:ln>
+        </p:spPr>
+      </p:pic>
+      <p:pic>
+        <p:nvPicPr>
+          <p:cNvPr id="1026" name="Picture 2" descr="Seguridad de la base de datos - Iconos gratis de seguridad">
+            <a:extLst>
+              <a:ext uri="{FF2B5EF4-FFF2-40B4-BE49-F238E27FC236}">
+                <a16:creationId xmlns:a16="http://schemas.microsoft.com/office/drawing/2014/main" id="{1EBBD5CE-7306-4C93-86BC-D43E76DF0346}"/>
+              </a:ext>
+            </a:extLst>
+          </p:cNvPr>
+          <p:cNvPicPr>
+            <a:picLocks noChangeAspect="1" noChangeArrowheads="1"/>
+          </p:cNvPicPr>
+          <p:nvPr/>
+        </p:nvPicPr>
+        <p:blipFill>
+          <a:blip r:embed="rId4">
+            <a:extLst>
+              <a:ext uri="{28A0092B-C50C-407E-A947-70E740481C1C}">
+                <a14:useLocalDpi xmlns:a14="http://schemas.microsoft.com/office/drawing/2010/main" val="0"/>
+              </a:ext>
+            </a:extLst>
+          </a:blip>
+          <a:srcRect/>
+          <a:stretch>
+            <a:fillRect/>
+          </a:stretch>
+        </p:blipFill>
+        <p:spPr bwMode="auto">
+          <a:xfrm>
+            <a:off x="2495204" y="3157824"/>
+            <a:ext cx="542351" cy="542351"/>
+          </a:xfrm>
+          <a:prstGeom prst="rect">
+            <a:avLst/>
+          </a:prstGeom>
+          <a:noFill/>
+          <a:extLst>
+            <a:ext uri="{909E8E84-426E-40DD-AFC4-6F175D3DCCD1}">
+              <a14:hiddenFill xmlns:a14="http://schemas.microsoft.com/office/drawing/2010/main">
+                <a:solidFill>
+                  <a:srgbClr val="FFFFFF"/>
+                </a:solidFill>
+              </a14:hiddenFill>
+            </a:ext>
+          </a:extLst>
+        </p:spPr>
+      </p:pic>
+      <p:pic>
+        <p:nvPicPr>
+          <p:cNvPr id="1030" name="Picture 6" descr="Base de datos - Iconos gratis de comunicaciones">
+            <a:extLst>
+              <a:ext uri="{FF2B5EF4-FFF2-40B4-BE49-F238E27FC236}">
+                <a16:creationId xmlns:a16="http://schemas.microsoft.com/office/drawing/2014/main" id="{839E2CDC-A752-475C-9721-C1A5A4518996}"/>
+              </a:ext>
+            </a:extLst>
+          </p:cNvPr>
+          <p:cNvPicPr>
+            <a:picLocks noChangeAspect="1" noChangeArrowheads="1"/>
+          </p:cNvPicPr>
+          <p:nvPr/>
+        </p:nvPicPr>
+        <p:blipFill rotWithShape="1">
+          <a:blip r:embed="rId5">
+            <a:extLst>
+              <a:ext uri="{28A0092B-C50C-407E-A947-70E740481C1C}">
+                <a14:useLocalDpi xmlns:a14="http://schemas.microsoft.com/office/drawing/2010/main" val="0"/>
+              </a:ext>
+            </a:extLst>
+          </a:blip>
+          <a:srcRect l="5156" t="7771" r="3787" b="6451"/>
+          <a:stretch/>
+        </p:blipFill>
+        <p:spPr bwMode="auto">
+          <a:xfrm>
+            <a:off x="1286442" y="1435135"/>
+            <a:ext cx="685347" cy="645606"/>
+          </a:xfrm>
+          <a:prstGeom prst="rect">
+            <a:avLst/>
+          </a:prstGeom>
+          <a:noFill/>
+          <a:extLst>
+            <a:ext uri="{909E8E84-426E-40DD-AFC4-6F175D3DCCD1}">
+              <a14:hiddenFill xmlns:a14="http://schemas.microsoft.com/office/drawing/2010/main">
+                <a:solidFill>
+                  <a:srgbClr val="FFFFFF"/>
+                </a:solidFill>
+              </a14:hiddenFill>
+            </a:ext>
+          </a:extLst>
+        </p:spPr>
+      </p:pic>
+      <p:pic>
+        <p:nvPicPr>
+          <p:cNvPr id="24" name="Picture 2" descr="Hugging Face">
+            <a:extLst>
+              <a:ext uri="{FF2B5EF4-FFF2-40B4-BE49-F238E27FC236}">
+                <a16:creationId xmlns:a16="http://schemas.microsoft.com/office/drawing/2014/main" id="{6F9B8976-38C0-42C4-9840-EA9413DB5852}"/>
+              </a:ext>
+            </a:extLst>
+          </p:cNvPr>
+          <p:cNvPicPr>
+            <a:picLocks noChangeAspect="1" noChangeArrowheads="1"/>
+          </p:cNvPicPr>
+          <p:nvPr/>
+        </p:nvPicPr>
+        <p:blipFill rotWithShape="1">
+          <a:blip r:embed="rId6">
+            <a:extLst>
+              <a:ext uri="{28A0092B-C50C-407E-A947-70E740481C1C}">
+                <a14:useLocalDpi xmlns:a14="http://schemas.microsoft.com/office/drawing/2010/main" val="0"/>
+              </a:ext>
+            </a:extLst>
+          </a:blip>
+          <a:srcRect l="28634" t="29013" r="28080" b="28993"/>
+          <a:stretch/>
+        </p:blipFill>
+        <p:spPr bwMode="auto">
+          <a:xfrm>
+            <a:off x="10255030" y="1988289"/>
+            <a:ext cx="1016952" cy="986633"/>
+          </a:xfrm>
+          <a:prstGeom prst="rect">
+            <a:avLst/>
+          </a:prstGeom>
+          <a:noFill/>
+          <a:extLst>
+            <a:ext uri="{909E8E84-426E-40DD-AFC4-6F175D3DCCD1}">
+              <a14:hiddenFill xmlns:a14="http://schemas.microsoft.com/office/drawing/2010/main">
+                <a:solidFill>
+                  <a:srgbClr val="FFFFFF"/>
+                </a:solidFill>
+              </a14:hiddenFill>
+            </a:ext>
+          </a:extLst>
+        </p:spPr>
+      </p:pic>
+      <p:pic>
+        <p:nvPicPr>
+          <p:cNvPr id="25" name="Picture 4" descr="Desbloquear el poder de la limpieza de datos eficaz: tÃ©cnicas, beneficios  y mejores prÃ¡cticas">
+            <a:extLst>
+              <a:ext uri="{FF2B5EF4-FFF2-40B4-BE49-F238E27FC236}">
+                <a16:creationId xmlns:a16="http://schemas.microsoft.com/office/drawing/2014/main" id="{8B307A9E-3BF0-45A4-B2CF-D803DFF20582}"/>
+              </a:ext>
+            </a:extLst>
+          </p:cNvPr>
+          <p:cNvPicPr>
+            <a:picLocks noChangeAspect="1" noChangeArrowheads="1"/>
+          </p:cNvPicPr>
+          <p:nvPr/>
+        </p:nvPicPr>
+        <p:blipFill>
+          <a:blip r:embed="rId7">
+            <a:extLst>
+              <a:ext uri="{28A0092B-C50C-407E-A947-70E740481C1C}">
+                <a14:useLocalDpi xmlns:a14="http://schemas.microsoft.com/office/drawing/2010/main" val="0"/>
+              </a:ext>
+            </a:extLst>
+          </a:blip>
+          <a:srcRect/>
+          <a:stretch>
+            <a:fillRect/>
+          </a:stretch>
+        </p:blipFill>
+        <p:spPr bwMode="auto">
+          <a:xfrm>
+            <a:off x="8754357" y="889836"/>
+            <a:ext cx="1009541" cy="1009541"/>
+          </a:xfrm>
+          <a:prstGeom prst="rect">
+            <a:avLst/>
+          </a:prstGeom>
+          <a:noFill/>
+          <a:extLst>
+            <a:ext uri="{909E8E84-426E-40DD-AFC4-6F175D3DCCD1}">
+              <a14:hiddenFill xmlns:a14="http://schemas.microsoft.com/office/drawing/2010/main">
+                <a:solidFill>
+                  <a:srgbClr val="FFFFFF"/>
+                </a:solidFill>
+              </a14:hiddenFill>
+            </a:ext>
+          </a:extLst>
+        </p:spPr>
+      </p:pic>
+      <p:pic>
+        <p:nvPicPr>
+          <p:cNvPr id="1032" name="Picture 8" descr="Proceso de Web Scraping">
+            <a:extLst>
+              <a:ext uri="{FF2B5EF4-FFF2-40B4-BE49-F238E27FC236}">
+                <a16:creationId xmlns:a16="http://schemas.microsoft.com/office/drawing/2014/main" id="{EE966221-7AE5-473E-A203-B8944C592861}"/>
+              </a:ext>
+            </a:extLst>
+          </p:cNvPr>
+          <p:cNvPicPr>
+            <a:picLocks noChangeAspect="1" noChangeArrowheads="1"/>
+          </p:cNvPicPr>
+          <p:nvPr/>
+        </p:nvPicPr>
+        <p:blipFill rotWithShape="1">
+          <a:blip r:embed="rId8">
+            <a:extLst>
+              <a:ext uri="{28A0092B-C50C-407E-A947-70E740481C1C}">
+                <a14:useLocalDpi xmlns:a14="http://schemas.microsoft.com/office/drawing/2010/main" val="0"/>
+              </a:ext>
+            </a:extLst>
+          </a:blip>
+          <a:srcRect l="7187" t="23025" r="5556" b="9260"/>
+          <a:stretch/>
+        </p:blipFill>
+        <p:spPr bwMode="auto">
+          <a:xfrm>
+            <a:off x="4001508" y="2008441"/>
+            <a:ext cx="1600571" cy="698663"/>
+          </a:xfrm>
+          <a:prstGeom prst="rect">
+            <a:avLst/>
+          </a:prstGeom>
+          <a:noFill/>
+          <a:extLst>
+            <a:ext uri="{909E8E84-426E-40DD-AFC4-6F175D3DCCD1}">
+              <a14:hiddenFill xmlns:a14="http://schemas.microsoft.com/office/drawing/2010/main">
+                <a:solidFill>
+                  <a:srgbClr val="FFFFFF"/>
+                </a:solidFill>
+              </a14:hiddenFill>
+            </a:ext>
+          </a:extLst>
+        </p:spPr>
+      </p:pic>
+      <p:pic>
+        <p:nvPicPr>
+          <p:cNvPr id="1034" name="Picture 10" descr="Representación de documentos mediante TF-IDF - YouTube">
+            <a:extLst>
+              <a:ext uri="{FF2B5EF4-FFF2-40B4-BE49-F238E27FC236}">
+                <a16:creationId xmlns:a16="http://schemas.microsoft.com/office/drawing/2014/main" id="{BFDB8E18-A754-4FA6-AD73-757163001644}"/>
+              </a:ext>
+            </a:extLst>
+          </p:cNvPr>
+          <p:cNvPicPr>
+            <a:picLocks noChangeAspect="1" noChangeArrowheads="1"/>
+          </p:cNvPicPr>
+          <p:nvPr/>
+        </p:nvPicPr>
+        <p:blipFill rotWithShape="1">
+          <a:blip r:embed="rId9">
+            <a:extLst>
+              <a:ext uri="{28A0092B-C50C-407E-A947-70E740481C1C}">
+                <a14:useLocalDpi xmlns:a14="http://schemas.microsoft.com/office/drawing/2010/main" val="0"/>
+              </a:ext>
+            </a:extLst>
+          </a:blip>
+          <a:srcRect l="7348" t="18395" r="24919" b="1705"/>
+          <a:stretch/>
+        </p:blipFill>
+        <p:spPr bwMode="auto">
+          <a:xfrm>
+            <a:off x="9023026" y="2080741"/>
+            <a:ext cx="1148450" cy="762281"/>
+          </a:xfrm>
+          <a:prstGeom prst="rect">
+            <a:avLst/>
+          </a:prstGeom>
+          <a:noFill/>
+          <a:extLst>
+            <a:ext uri="{909E8E84-426E-40DD-AFC4-6F175D3DCCD1}">
+              <a14:hiddenFill xmlns:a14="http://schemas.microsoft.com/office/drawing/2010/main">
+                <a:solidFill>
+                  <a:srgbClr val="FFFFFF"/>
+                </a:solidFill>
+              </a14:hiddenFill>
+            </a:ext>
+          </a:extLst>
+        </p:spPr>
+      </p:pic>
+      <p:pic>
+        <p:nvPicPr>
+          <p:cNvPr id="1036" name="Picture 12" descr="Keras: Deep Learning for humans">
+            <a:extLst>
+              <a:ext uri="{FF2B5EF4-FFF2-40B4-BE49-F238E27FC236}">
+                <a16:creationId xmlns:a16="http://schemas.microsoft.com/office/drawing/2014/main" id="{78608EC1-C13D-4742-A741-779E0067E9EF}"/>
+              </a:ext>
+            </a:extLst>
+          </p:cNvPr>
+          <p:cNvPicPr>
+            <a:picLocks noChangeAspect="1" noChangeArrowheads="1"/>
+          </p:cNvPicPr>
+          <p:nvPr/>
+        </p:nvPicPr>
+        <p:blipFill>
+          <a:blip r:embed="rId10">
+            <a:extLst>
+              <a:ext uri="{28A0092B-C50C-407E-A947-70E740481C1C}">
+                <a14:useLocalDpi xmlns:a14="http://schemas.microsoft.com/office/drawing/2010/main" val="0"/>
+              </a:ext>
+            </a:extLst>
+          </a:blip>
+          <a:srcRect/>
+          <a:stretch>
+            <a:fillRect/>
+          </a:stretch>
+        </p:blipFill>
+        <p:spPr bwMode="auto">
+          <a:xfrm>
+            <a:off x="10417795" y="4477393"/>
+            <a:ext cx="1206538" cy="349896"/>
+          </a:xfrm>
+          <a:prstGeom prst="rect">
+            <a:avLst/>
+          </a:prstGeom>
+          <a:noFill/>
+          <a:extLst>
+            <a:ext uri="{909E8E84-426E-40DD-AFC4-6F175D3DCCD1}">
+              <a14:hiddenFill xmlns:a14="http://schemas.microsoft.com/office/drawing/2010/main">
+                <a:solidFill>
+                  <a:srgbClr val="FFFFFF"/>
+                </a:solidFill>
+              </a14:hiddenFill>
+            </a:ext>
+          </a:extLst>
+        </p:spPr>
+      </p:pic>
+      <p:pic>
+        <p:nvPicPr>
+          <p:cNvPr id="1038" name="Picture 14" descr="Algoritmo - Iconos gratis de editar herramientas">
+            <a:extLst>
+              <a:ext uri="{FF2B5EF4-FFF2-40B4-BE49-F238E27FC236}">
+                <a16:creationId xmlns:a16="http://schemas.microsoft.com/office/drawing/2014/main" id="{BC62E01A-14AC-4F66-8BBD-6D93C5DF566F}"/>
+              </a:ext>
+            </a:extLst>
+          </p:cNvPr>
+          <p:cNvPicPr>
+            <a:picLocks noChangeAspect="1" noChangeArrowheads="1"/>
+          </p:cNvPicPr>
+          <p:nvPr/>
+        </p:nvPicPr>
+        <p:blipFill>
+          <a:blip r:embed="rId11">
+            <a:extLst>
+              <a:ext uri="{28A0092B-C50C-407E-A947-70E740481C1C}">
+                <a14:useLocalDpi xmlns:a14="http://schemas.microsoft.com/office/drawing/2010/main" val="0"/>
+              </a:ext>
+            </a:extLst>
+          </a:blip>
+          <a:srcRect/>
+          <a:stretch>
+            <a:fillRect/>
+          </a:stretch>
+        </p:blipFill>
+        <p:spPr bwMode="auto">
+          <a:xfrm>
+            <a:off x="6781800" y="3729888"/>
+            <a:ext cx="922453" cy="922453"/>
+          </a:xfrm>
+          <a:prstGeom prst="rect">
+            <a:avLst/>
+          </a:prstGeom>
+          <a:noFill/>
+          <a:extLst>
+            <a:ext uri="{909E8E84-426E-40DD-AFC4-6F175D3DCCD1}">
+              <a14:hiddenFill xmlns:a14="http://schemas.microsoft.com/office/drawing/2010/main">
+                <a:solidFill>
+                  <a:srgbClr val="FFFFFF"/>
+                </a:solidFill>
+              </a14:hiddenFill>
+            </a:ext>
+          </a:extLst>
+        </p:spPr>
+      </p:pic>
+      <p:pic>
+        <p:nvPicPr>
+          <p:cNvPr id="1040" name="Picture 16" descr="Comparison Generic Outline Color icon | Freepik">
+            <a:extLst>
+              <a:ext uri="{FF2B5EF4-FFF2-40B4-BE49-F238E27FC236}">
+                <a16:creationId xmlns:a16="http://schemas.microsoft.com/office/drawing/2014/main" id="{84CCE91B-F4D7-4F3A-AF31-3A245FC22E7A}"/>
+              </a:ext>
+            </a:extLst>
+          </p:cNvPr>
+          <p:cNvPicPr>
+            <a:picLocks noChangeAspect="1" noChangeArrowheads="1"/>
+          </p:cNvPicPr>
+          <p:nvPr/>
+        </p:nvPicPr>
+        <p:blipFill>
+          <a:blip r:embed="rId12">
+            <a:extLst>
+              <a:ext uri="{28A0092B-C50C-407E-A947-70E740481C1C}">
+                <a14:useLocalDpi xmlns:a14="http://schemas.microsoft.com/office/drawing/2010/main" val="0"/>
+              </a:ext>
+            </a:extLst>
+          </a:blip>
+          <a:srcRect/>
+          <a:stretch>
+            <a:fillRect/>
+          </a:stretch>
+        </p:blipFill>
+        <p:spPr bwMode="auto">
+          <a:xfrm>
+            <a:off x="10149486" y="5786568"/>
+            <a:ext cx="1003873" cy="1003873"/>
+          </a:xfrm>
+          <a:prstGeom prst="rect">
+            <a:avLst/>
+          </a:prstGeom>
+          <a:noFill/>
+          <a:extLst>
+            <a:ext uri="{909E8E84-426E-40DD-AFC4-6F175D3DCCD1}">
+              <a14:hiddenFill xmlns:a14="http://schemas.microsoft.com/office/drawing/2010/main">
+                <a:solidFill>
+                  <a:srgbClr val="FFFFFF"/>
+                </a:solidFill>
+              </a14:hiddenFill>
+            </a:ext>
+          </a:extLst>
+        </p:spPr>
+      </p:pic>
+      <p:pic>
+        <p:nvPicPr>
+          <p:cNvPr id="1042" name="Picture 18" descr="Datasets - DataForImpactProject">
+            <a:extLst>
+              <a:ext uri="{FF2B5EF4-FFF2-40B4-BE49-F238E27FC236}">
+                <a16:creationId xmlns:a16="http://schemas.microsoft.com/office/drawing/2014/main" id="{438E4823-BCBA-4AB9-82B1-82EECF985A52}"/>
+              </a:ext>
+            </a:extLst>
+          </p:cNvPr>
+          <p:cNvPicPr>
+            <a:picLocks noChangeAspect="1" noChangeArrowheads="1"/>
+          </p:cNvPicPr>
+          <p:nvPr/>
+        </p:nvPicPr>
+        <p:blipFill>
+          <a:blip r:embed="rId13">
+            <a:extLst>
+              <a:ext uri="{28A0092B-C50C-407E-A947-70E740481C1C}">
+                <a14:useLocalDpi xmlns:a14="http://schemas.microsoft.com/office/drawing/2010/main" val="0"/>
+              </a:ext>
+            </a:extLst>
+          </a:blip>
+          <a:srcRect/>
+          <a:stretch>
+            <a:fillRect/>
+          </a:stretch>
+        </p:blipFill>
+        <p:spPr bwMode="auto">
+          <a:xfrm>
+            <a:off x="10172983" y="103700"/>
+            <a:ext cx="1327261" cy="1331435"/>
+          </a:xfrm>
+          <a:prstGeom prst="rect">
+            <a:avLst/>
+          </a:prstGeom>
+          <a:noFill/>
+          <a:extLst>
+            <a:ext uri="{909E8E84-426E-40DD-AFC4-6F175D3DCCD1}">
+              <a14:hiddenFill xmlns:a14="http://schemas.microsoft.com/office/drawing/2010/main">
+                <a:solidFill>
+                  <a:srgbClr val="FFFFFF"/>
+                </a:solidFill>
+              </a14:hiddenFill>
+            </a:ext>
+          </a:extLst>
+        </p:spPr>
+      </p:pic>
+      <p:sp>
+        <p:nvSpPr>
+          <p:cNvPr id="63" name="Marcador de contenido 2">
+            <a:extLst>
+              <a:ext uri="{FF2B5EF4-FFF2-40B4-BE49-F238E27FC236}">
+                <a16:creationId xmlns:a16="http://schemas.microsoft.com/office/drawing/2014/main" id="{3D19C736-A91B-4877-9BCB-3FE8A271C72D}"/>
+              </a:ext>
+            </a:extLst>
+          </p:cNvPr>
+          <p:cNvSpPr>
+            <a:spLocks noGrp="1"/>
+          </p:cNvSpPr>
+          <p:nvPr>
+            <p:ph idx="1"/>
+          </p:nvPr>
+        </p:nvSpPr>
+        <p:spPr>
+          <a:xfrm>
+            <a:off x="10288243" y="99867"/>
+            <a:ext cx="677015" cy="349398"/>
+          </a:xfrm>
+        </p:spPr>
+        <p:txBody>
+          <a:bodyPr>
+            <a:normAutofit/>
+          </a:bodyPr>
+          <a:lstStyle/>
+          <a:p>
+            <a:pPr marL="0" indent="0">
+              <a:buNone/>
+            </a:pPr>
+            <a:r>
+              <a:rPr lang="es-MX" sz="1800" dirty="0">
+                <a:solidFill>
+                  <a:srgbClr val="A7BF39"/>
+                </a:solidFill>
+              </a:rPr>
+              <a:t>70%</a:t>
+            </a:r>
+          </a:p>
+        </p:txBody>
+      </p:sp>
+      <p:sp>
+        <p:nvSpPr>
+          <p:cNvPr id="64" name="Marcador de contenido 2">
+            <a:extLst>
+              <a:ext uri="{FF2B5EF4-FFF2-40B4-BE49-F238E27FC236}">
+                <a16:creationId xmlns:a16="http://schemas.microsoft.com/office/drawing/2014/main" id="{98D01804-CC01-4EE1-AB35-654DF33E1FA5}"/>
+              </a:ext>
+            </a:extLst>
+          </p:cNvPr>
+          <p:cNvSpPr txBox="1">
+            <a:spLocks/>
+          </p:cNvSpPr>
+          <p:nvPr/>
+        </p:nvSpPr>
+        <p:spPr>
+          <a:xfrm>
+            <a:off x="11056353" y="355949"/>
+            <a:ext cx="481433" cy="349398"/>
+          </a:xfrm>
+          <a:prstGeom prst="rect">
+            <a:avLst/>
+          </a:prstGeom>
+        </p:spPr>
+        <p:txBody>
+          <a:bodyPr vert="horz" lIns="91440" tIns="45720" rIns="91440" bIns="45720" rtlCol="0">
+            <a:normAutofit/>
+          </a:bodyPr>
+          <a:lstStyle>
+            <a:lvl1pPr marL="228600" indent="-228600" algn="l" defTabSz="914400" rtl="0" eaLnBrk="1" latinLnBrk="0" hangingPunct="1">
+              <a:lnSpc>
+                <a:spcPct val="90000"/>
+              </a:lnSpc>
+              <a:spcBef>
+                <a:spcPts val="1000"/>
+              </a:spcBef>
+              <a:buFont typeface="Arial" panose="020B0604020202020204" pitchFamily="34" charset="0"/>
+              <a:buChar char="•"/>
+              <a:defRPr sz="2800" kern="1200">
+                <a:solidFill>
+                  <a:schemeClr val="tx1"/>
+                </a:solidFill>
+                <a:latin typeface="+mn-lt"/>
+                <a:ea typeface="+mn-ea"/>
+                <a:cs typeface="+mn-cs"/>
+              </a:defRPr>
+            </a:lvl1pPr>
+            <a:lvl2pPr marL="685800" indent="-228600" algn="l" defTabSz="914400" rtl="0" eaLnBrk="1" latinLnBrk="0" hangingPunct="1">
+              <a:lnSpc>
+                <a:spcPct val="90000"/>
+              </a:lnSpc>
+              <a:spcBef>
+                <a:spcPts val="500"/>
+              </a:spcBef>
+              <a:buFont typeface="Arial" panose="020B0604020202020204" pitchFamily="34" charset="0"/>
+              <a:buChar char="•"/>
+              <a:defRPr sz="2400" kern="1200">
+                <a:solidFill>
+                  <a:schemeClr val="tx1"/>
+                </a:solidFill>
+                <a:latin typeface="+mn-lt"/>
+                <a:ea typeface="+mn-ea"/>
+                <a:cs typeface="+mn-cs"/>
+              </a:defRPr>
+            </a:lvl2pPr>
+            <a:lvl3pPr marL="1143000" indent="-228600" algn="l" defTabSz="914400" rtl="0" eaLnBrk="1" latinLnBrk="0" hangingPunct="1">
+              <a:lnSpc>
+                <a:spcPct val="90000"/>
+              </a:lnSpc>
+              <a:spcBef>
+                <a:spcPts val="500"/>
+              </a:spcBef>
+              <a:buFont typeface="Arial" panose="020B0604020202020204" pitchFamily="34" charset="0"/>
+              <a:buChar char="•"/>
+              <a:defRPr sz="2000" kern="1200">
+                <a:solidFill>
+                  <a:schemeClr val="tx1"/>
+                </a:solidFill>
+                <a:latin typeface="+mn-lt"/>
+                <a:ea typeface="+mn-ea"/>
+                <a:cs typeface="+mn-cs"/>
+              </a:defRPr>
+            </a:lvl3pPr>
+            <a:lvl4pPr marL="1600200" indent="-228600" algn="l" defTabSz="914400" rtl="0" eaLnBrk="1" latinLnBrk="0" hangingPunct="1">
+              <a:lnSpc>
+                <a:spcPct val="90000"/>
+              </a:lnSpc>
+              <a:spcBef>
+                <a:spcPts val="500"/>
+              </a:spcBef>
+              <a:buFont typeface="Arial" panose="020B0604020202020204" pitchFamily="34" charset="0"/>
+              <a:buChar char="•"/>
+              <a:defRPr sz="1800" kern="1200">
+                <a:solidFill>
+                  <a:schemeClr val="tx1"/>
+                </a:solidFill>
+                <a:latin typeface="+mn-lt"/>
+                <a:ea typeface="+mn-ea"/>
+                <a:cs typeface="+mn-cs"/>
+              </a:defRPr>
+            </a:lvl4pPr>
+            <a:lvl5pPr marL="2057400" indent="-228600" algn="l" defTabSz="914400" rtl="0" eaLnBrk="1" latinLnBrk="0" hangingPunct="1">
+              <a:lnSpc>
+                <a:spcPct val="90000"/>
+              </a:lnSpc>
+              <a:spcBef>
+                <a:spcPts val="500"/>
+              </a:spcBef>
+              <a:buFont typeface="Arial" panose="020B0604020202020204" pitchFamily="34" charset="0"/>
+              <a:buChar char="•"/>
+              <a:defRPr sz="1800" kern="1200">
+                <a:solidFill>
+                  <a:schemeClr val="tx1"/>
+                </a:solidFill>
+                <a:latin typeface="+mn-lt"/>
+                <a:ea typeface="+mn-ea"/>
+                <a:cs typeface="+mn-cs"/>
+              </a:defRPr>
+            </a:lvl5pPr>
+            <a:lvl6pPr marL="2514600" indent="-228600" algn="l" defTabSz="914400" rtl="0" eaLnBrk="1" latinLnBrk="0" hangingPunct="1">
+              <a:lnSpc>
+                <a:spcPct val="90000"/>
+              </a:lnSpc>
+              <a:spcBef>
+                <a:spcPts val="500"/>
+              </a:spcBef>
+              <a:buFont typeface="Arial" panose="020B0604020202020204" pitchFamily="34" charset="0"/>
+              <a:buChar char="•"/>
+              <a:defRPr sz="1800" kern="1200">
+                <a:solidFill>
+                  <a:schemeClr val="tx1"/>
+                </a:solidFill>
+                <a:latin typeface="+mn-lt"/>
+                <a:ea typeface="+mn-ea"/>
+                <a:cs typeface="+mn-cs"/>
+              </a:defRPr>
+            </a:lvl6pPr>
+            <a:lvl7pPr marL="2971800" indent="-228600" algn="l" defTabSz="914400" rtl="0" eaLnBrk="1" latinLnBrk="0" hangingPunct="1">
+              <a:lnSpc>
+                <a:spcPct val="90000"/>
+              </a:lnSpc>
+              <a:spcBef>
+                <a:spcPts val="500"/>
+              </a:spcBef>
+              <a:buFont typeface="Arial" panose="020B0604020202020204" pitchFamily="34" charset="0"/>
+              <a:buChar char="•"/>
+              <a:defRPr sz="1800" kern="1200">
+                <a:solidFill>
+                  <a:schemeClr val="tx1"/>
+                </a:solidFill>
+                <a:latin typeface="+mn-lt"/>
+                <a:ea typeface="+mn-ea"/>
+                <a:cs typeface="+mn-cs"/>
+              </a:defRPr>
+            </a:lvl7pPr>
+            <a:lvl8pPr marL="3429000" indent="-228600" algn="l" defTabSz="914400" rtl="0" eaLnBrk="1" latinLnBrk="0" hangingPunct="1">
+              <a:lnSpc>
+                <a:spcPct val="90000"/>
+              </a:lnSpc>
+              <a:spcBef>
+                <a:spcPts val="500"/>
+              </a:spcBef>
+              <a:buFont typeface="Arial" panose="020B0604020202020204" pitchFamily="34" charset="0"/>
+              <a:buChar char="•"/>
+              <a:defRPr sz="1800" kern="1200">
+                <a:solidFill>
+                  <a:schemeClr val="tx1"/>
+                </a:solidFill>
+                <a:latin typeface="+mn-lt"/>
+                <a:ea typeface="+mn-ea"/>
+                <a:cs typeface="+mn-cs"/>
+              </a:defRPr>
+            </a:lvl8pPr>
+            <a:lvl9pPr marL="3886200" indent="-228600" algn="l" defTabSz="914400" rtl="0" eaLnBrk="1" latinLnBrk="0" hangingPunct="1">
+              <a:lnSpc>
+                <a:spcPct val="90000"/>
+              </a:lnSpc>
+              <a:spcBef>
+                <a:spcPts val="500"/>
+              </a:spcBef>
+              <a:buFont typeface="Arial" panose="020B0604020202020204" pitchFamily="34" charset="0"/>
+              <a:buChar char="•"/>
+              <a:defRPr sz="1800" kern="1200">
+                <a:solidFill>
+                  <a:schemeClr val="tx1"/>
+                </a:solidFill>
+                <a:latin typeface="+mn-lt"/>
+                <a:ea typeface="+mn-ea"/>
+                <a:cs typeface="+mn-cs"/>
+              </a:defRPr>
+            </a:lvl9pPr>
+          </a:lstStyle>
+          <a:p>
+            <a:pPr marL="0" indent="0">
+              <a:buFont typeface="Arial" panose="020B0604020202020204" pitchFamily="34" charset="0"/>
+              <a:buNone/>
+            </a:pPr>
+            <a:r>
+              <a:rPr lang="es-MX" sz="1200" dirty="0">
+                <a:solidFill>
+                  <a:srgbClr val="D44102"/>
+                </a:solidFill>
+              </a:rPr>
+              <a:t>10%</a:t>
+            </a:r>
+          </a:p>
+        </p:txBody>
+      </p:sp>
+      <p:sp>
+        <p:nvSpPr>
+          <p:cNvPr id="65" name="Marcador de contenido 2">
+            <a:extLst>
+              <a:ext uri="{FF2B5EF4-FFF2-40B4-BE49-F238E27FC236}">
+                <a16:creationId xmlns:a16="http://schemas.microsoft.com/office/drawing/2014/main" id="{4040B223-B084-42FB-9894-4D0159DBCFF8}"/>
+              </a:ext>
+            </a:extLst>
+          </p:cNvPr>
+          <p:cNvSpPr txBox="1">
+            <a:spLocks/>
+          </p:cNvSpPr>
+          <p:nvPr/>
+        </p:nvSpPr>
+        <p:spPr>
+          <a:xfrm>
+            <a:off x="10683561" y="567490"/>
+            <a:ext cx="588422" cy="393486"/>
+          </a:xfrm>
+          <a:prstGeom prst="rect">
+            <a:avLst/>
+          </a:prstGeom>
+        </p:spPr>
+        <p:txBody>
+          <a:bodyPr vert="horz" lIns="91440" tIns="45720" rIns="91440" bIns="45720" rtlCol="0">
+            <a:normAutofit/>
+          </a:bodyPr>
+          <a:lstStyle>
+            <a:lvl1pPr marL="228600" indent="-228600" algn="l" defTabSz="914400" rtl="0" eaLnBrk="1" latinLnBrk="0" hangingPunct="1">
+              <a:lnSpc>
+                <a:spcPct val="90000"/>
+              </a:lnSpc>
+              <a:spcBef>
+                <a:spcPts val="1000"/>
+              </a:spcBef>
+              <a:buFont typeface="Arial" panose="020B0604020202020204" pitchFamily="34" charset="0"/>
+              <a:buChar char="•"/>
+              <a:defRPr sz="2800" kern="1200">
+                <a:solidFill>
+                  <a:schemeClr val="tx1"/>
+                </a:solidFill>
+                <a:latin typeface="+mn-lt"/>
+                <a:ea typeface="+mn-ea"/>
+                <a:cs typeface="+mn-cs"/>
+              </a:defRPr>
+            </a:lvl1pPr>
+            <a:lvl2pPr marL="685800" indent="-228600" algn="l" defTabSz="914400" rtl="0" eaLnBrk="1" latinLnBrk="0" hangingPunct="1">
+              <a:lnSpc>
+                <a:spcPct val="90000"/>
+              </a:lnSpc>
+              <a:spcBef>
+                <a:spcPts val="500"/>
+              </a:spcBef>
+              <a:buFont typeface="Arial" panose="020B0604020202020204" pitchFamily="34" charset="0"/>
+              <a:buChar char="•"/>
+              <a:defRPr sz="2400" kern="1200">
+                <a:solidFill>
+                  <a:schemeClr val="tx1"/>
+                </a:solidFill>
+                <a:latin typeface="+mn-lt"/>
+                <a:ea typeface="+mn-ea"/>
+                <a:cs typeface="+mn-cs"/>
+              </a:defRPr>
+            </a:lvl2pPr>
+            <a:lvl3pPr marL="1143000" indent="-228600" algn="l" defTabSz="914400" rtl="0" eaLnBrk="1" latinLnBrk="0" hangingPunct="1">
+              <a:lnSpc>
+                <a:spcPct val="90000"/>
+              </a:lnSpc>
+              <a:spcBef>
+                <a:spcPts val="500"/>
+              </a:spcBef>
+              <a:buFont typeface="Arial" panose="020B0604020202020204" pitchFamily="34" charset="0"/>
+              <a:buChar char="•"/>
+              <a:defRPr sz="2000" kern="1200">
+                <a:solidFill>
+                  <a:schemeClr val="tx1"/>
+                </a:solidFill>
+                <a:latin typeface="+mn-lt"/>
+                <a:ea typeface="+mn-ea"/>
+                <a:cs typeface="+mn-cs"/>
+              </a:defRPr>
+            </a:lvl3pPr>
+            <a:lvl4pPr marL="1600200" indent="-228600" algn="l" defTabSz="914400" rtl="0" eaLnBrk="1" latinLnBrk="0" hangingPunct="1">
+              <a:lnSpc>
+                <a:spcPct val="90000"/>
+              </a:lnSpc>
+              <a:spcBef>
+                <a:spcPts val="500"/>
+              </a:spcBef>
+              <a:buFont typeface="Arial" panose="020B0604020202020204" pitchFamily="34" charset="0"/>
+              <a:buChar char="•"/>
+              <a:defRPr sz="1800" kern="1200">
+                <a:solidFill>
+                  <a:schemeClr val="tx1"/>
+                </a:solidFill>
+                <a:latin typeface="+mn-lt"/>
+                <a:ea typeface="+mn-ea"/>
+                <a:cs typeface="+mn-cs"/>
+              </a:defRPr>
+            </a:lvl4pPr>
+            <a:lvl5pPr marL="2057400" indent="-228600" algn="l" defTabSz="914400" rtl="0" eaLnBrk="1" latinLnBrk="0" hangingPunct="1">
+              <a:lnSpc>
+                <a:spcPct val="90000"/>
+              </a:lnSpc>
+              <a:spcBef>
+                <a:spcPts val="500"/>
+              </a:spcBef>
+              <a:buFont typeface="Arial" panose="020B0604020202020204" pitchFamily="34" charset="0"/>
+              <a:buChar char="•"/>
+              <a:defRPr sz="1800" kern="1200">
+                <a:solidFill>
+                  <a:schemeClr val="tx1"/>
+                </a:solidFill>
+                <a:latin typeface="+mn-lt"/>
+                <a:ea typeface="+mn-ea"/>
+                <a:cs typeface="+mn-cs"/>
+              </a:defRPr>
+            </a:lvl5pPr>
+            <a:lvl6pPr marL="2514600" indent="-228600" algn="l" defTabSz="914400" rtl="0" eaLnBrk="1" latinLnBrk="0" hangingPunct="1">
+              <a:lnSpc>
+                <a:spcPct val="90000"/>
+              </a:lnSpc>
+              <a:spcBef>
+                <a:spcPts val="500"/>
+              </a:spcBef>
+              <a:buFont typeface="Arial" panose="020B0604020202020204" pitchFamily="34" charset="0"/>
+              <a:buChar char="•"/>
+              <a:defRPr sz="1800" kern="1200">
+                <a:solidFill>
+                  <a:schemeClr val="tx1"/>
+                </a:solidFill>
+                <a:latin typeface="+mn-lt"/>
+                <a:ea typeface="+mn-ea"/>
+                <a:cs typeface="+mn-cs"/>
+              </a:defRPr>
+            </a:lvl6pPr>
+            <a:lvl7pPr marL="2971800" indent="-228600" algn="l" defTabSz="914400" rtl="0" eaLnBrk="1" latinLnBrk="0" hangingPunct="1">
+              <a:lnSpc>
+                <a:spcPct val="90000"/>
+              </a:lnSpc>
+              <a:spcBef>
+                <a:spcPts val="500"/>
+              </a:spcBef>
+              <a:buFont typeface="Arial" panose="020B0604020202020204" pitchFamily="34" charset="0"/>
+              <a:buChar char="•"/>
+              <a:defRPr sz="1800" kern="1200">
+                <a:solidFill>
+                  <a:schemeClr val="tx1"/>
+                </a:solidFill>
+                <a:latin typeface="+mn-lt"/>
+                <a:ea typeface="+mn-ea"/>
+                <a:cs typeface="+mn-cs"/>
+              </a:defRPr>
+            </a:lvl7pPr>
+            <a:lvl8pPr marL="3429000" indent="-228600" algn="l" defTabSz="914400" rtl="0" eaLnBrk="1" latinLnBrk="0" hangingPunct="1">
+              <a:lnSpc>
+                <a:spcPct val="90000"/>
+              </a:lnSpc>
+              <a:spcBef>
+                <a:spcPts val="500"/>
+              </a:spcBef>
+              <a:buFont typeface="Arial" panose="020B0604020202020204" pitchFamily="34" charset="0"/>
+              <a:buChar char="•"/>
+              <a:defRPr sz="1800" kern="1200">
+                <a:solidFill>
+                  <a:schemeClr val="tx1"/>
+                </a:solidFill>
+                <a:latin typeface="+mn-lt"/>
+                <a:ea typeface="+mn-ea"/>
+                <a:cs typeface="+mn-cs"/>
+              </a:defRPr>
+            </a:lvl8pPr>
+            <a:lvl9pPr marL="3886200" indent="-228600" algn="l" defTabSz="914400" rtl="0" eaLnBrk="1" latinLnBrk="0" hangingPunct="1">
+              <a:lnSpc>
+                <a:spcPct val="90000"/>
+              </a:lnSpc>
+              <a:spcBef>
+                <a:spcPts val="500"/>
+              </a:spcBef>
+              <a:buFont typeface="Arial" panose="020B0604020202020204" pitchFamily="34" charset="0"/>
+              <a:buChar char="•"/>
+              <a:defRPr sz="1800" kern="1200">
+                <a:solidFill>
+                  <a:schemeClr val="tx1"/>
+                </a:solidFill>
+                <a:latin typeface="+mn-lt"/>
+                <a:ea typeface="+mn-ea"/>
+                <a:cs typeface="+mn-cs"/>
+              </a:defRPr>
+            </a:lvl9pPr>
+          </a:lstStyle>
+          <a:p>
+            <a:pPr marL="0" indent="0">
+              <a:buFont typeface="Arial" panose="020B0604020202020204" pitchFamily="34" charset="0"/>
+              <a:buNone/>
+            </a:pPr>
+            <a:r>
+              <a:rPr lang="es-MX" sz="1700" dirty="0">
+                <a:solidFill>
+                  <a:srgbClr val="264E59"/>
+                </a:solidFill>
+              </a:rPr>
+              <a:t>20%</a:t>
+            </a:r>
+          </a:p>
+        </p:txBody>
+      </p:sp>
+      <p:pic>
+        <p:nvPicPr>
+          <p:cNvPr id="57" name="Imagen 56">
+            <a:extLst>
+              <a:ext uri="{FF2B5EF4-FFF2-40B4-BE49-F238E27FC236}">
+                <a16:creationId xmlns:a16="http://schemas.microsoft.com/office/drawing/2014/main" id="{F3F21D8C-7624-465E-8D6A-DEB7DE80D688}"/>
+              </a:ext>
+            </a:extLst>
+          </p:cNvPr>
+          <p:cNvPicPr>
+            <a:picLocks noChangeAspect="1"/>
+          </p:cNvPicPr>
+          <p:nvPr/>
+        </p:nvPicPr>
+        <p:blipFill rotWithShape="1">
+          <a:blip r:embed="rId14">
+            <a:extLst>
+              <a:ext uri="{28A0092B-C50C-407E-A947-70E740481C1C}">
+                <a14:useLocalDpi xmlns:a14="http://schemas.microsoft.com/office/drawing/2010/main" val="0"/>
+              </a:ext>
+            </a:extLst>
+          </a:blip>
+          <a:srcRect l="4365"/>
+          <a:stretch/>
+        </p:blipFill>
+        <p:spPr>
+          <a:xfrm>
+            <a:off x="83231" y="4135521"/>
+            <a:ext cx="5366298" cy="2688300"/>
+          </a:xfrm>
+          <a:prstGeom prst="rect">
+            <a:avLst/>
+          </a:prstGeom>
+          <a:ln>
+            <a:solidFill>
+              <a:schemeClr val="accent1"/>
+            </a:solidFill>
+          </a:ln>
+        </p:spPr>
+      </p:pic>
+      <p:cxnSp>
+        <p:nvCxnSpPr>
+          <p:cNvPr id="67" name="Conector recto de flecha 66">
+            <a:extLst>
+              <a:ext uri="{FF2B5EF4-FFF2-40B4-BE49-F238E27FC236}">
+                <a16:creationId xmlns:a16="http://schemas.microsoft.com/office/drawing/2014/main" id="{31A4E42A-D0F7-425D-A70A-54DE58187C8B}"/>
+              </a:ext>
+            </a:extLst>
+          </p:cNvPr>
+          <p:cNvCxnSpPr>
+            <a:cxnSpLocks/>
+            <a:endCxn id="62" idx="3"/>
+          </p:cNvCxnSpPr>
+          <p:nvPr/>
+        </p:nvCxnSpPr>
+        <p:spPr>
+          <a:xfrm flipH="1">
+            <a:off x="8196185" y="6466441"/>
+            <a:ext cx="176290" cy="0"/>
+          </a:xfrm>
+          <a:prstGeom prst="straightConnector1">
+            <a:avLst/>
+          </a:prstGeom>
+          <a:ln>
+            <a:tailEnd type="triangle"/>
+          </a:ln>
+        </p:spPr>
+        <p:style>
+          <a:lnRef idx="1">
+            <a:schemeClr val="accent3"/>
+          </a:lnRef>
+          <a:fillRef idx="0">
+            <a:schemeClr val="accent3"/>
+          </a:fillRef>
+          <a:effectRef idx="0">
+            <a:schemeClr val="accent3"/>
+          </a:effectRef>
+          <a:fontRef idx="minor">
+            <a:schemeClr val="tx1"/>
+          </a:fontRef>
+        </p:style>
+      </p:cxnSp>
+      <p:pic>
+        <p:nvPicPr>
+          <p:cNvPr id="62" name="Imagen 61">
+            <a:extLst>
+              <a:ext uri="{FF2B5EF4-FFF2-40B4-BE49-F238E27FC236}">
+                <a16:creationId xmlns:a16="http://schemas.microsoft.com/office/drawing/2014/main" id="{768B6529-3A7C-4BED-857D-0787411D58D1}"/>
+              </a:ext>
+            </a:extLst>
+          </p:cNvPr>
+          <p:cNvPicPr>
+            <a:picLocks noChangeAspect="1"/>
+          </p:cNvPicPr>
+          <p:nvPr/>
+        </p:nvPicPr>
+        <p:blipFill rotWithShape="1">
+          <a:blip r:embed="rId15">
+            <a:extLst>
+              <a:ext uri="{28A0092B-C50C-407E-A947-70E740481C1C}">
+                <a14:useLocalDpi xmlns:a14="http://schemas.microsoft.com/office/drawing/2010/main" val="0"/>
+              </a:ext>
+            </a:extLst>
+          </a:blip>
+          <a:srcRect l="51311" t="72817" r="33277" b="17275"/>
+          <a:stretch/>
+        </p:blipFill>
+        <p:spPr>
+          <a:xfrm>
+            <a:off x="6561047" y="6142441"/>
+            <a:ext cx="1635138" cy="648000"/>
+          </a:xfrm>
+          <a:prstGeom prst="rect">
+            <a:avLst/>
+          </a:prstGeom>
+        </p:spPr>
+      </p:pic>
+      <p:cxnSp>
+        <p:nvCxnSpPr>
+          <p:cNvPr id="73" name="Conector: angular 72">
+            <a:extLst>
+              <a:ext uri="{FF2B5EF4-FFF2-40B4-BE49-F238E27FC236}">
+                <a16:creationId xmlns:a16="http://schemas.microsoft.com/office/drawing/2014/main" id="{6FE8A4D0-24F9-40DC-A108-33A865806CE0}"/>
+              </a:ext>
+            </a:extLst>
+          </p:cNvPr>
+          <p:cNvCxnSpPr>
+            <a:cxnSpLocks/>
+            <a:stCxn id="62" idx="1"/>
+          </p:cNvCxnSpPr>
+          <p:nvPr/>
+        </p:nvCxnSpPr>
+        <p:spPr>
+          <a:xfrm rot="10800000">
+            <a:off x="3762375" y="6353175"/>
+            <a:ext cx="2798672" cy="113266"/>
+          </a:xfrm>
+          <a:prstGeom prst="bentConnector3">
+            <a:avLst/>
+          </a:prstGeom>
+          <a:ln>
+            <a:tailEnd type="triangle"/>
+          </a:ln>
+        </p:spPr>
+        <p:style>
+          <a:lnRef idx="1">
+            <a:schemeClr val="accent1"/>
+          </a:lnRef>
+          <a:fillRef idx="0">
+            <a:schemeClr val="accent1"/>
+          </a:fillRef>
+          <a:effectRef idx="0">
+            <a:schemeClr val="accent1"/>
+          </a:effectRef>
+          <a:fontRef idx="minor">
+            <a:schemeClr val="tx1"/>
+          </a:fontRef>
+        </p:style>
+      </p:cxnSp>
+      <p:pic>
+        <p:nvPicPr>
+          <p:cNvPr id="1044" name="Picture 20" descr="Flask - Wikipedia, la enciclopedia libre">
+            <a:extLst>
+              <a:ext uri="{FF2B5EF4-FFF2-40B4-BE49-F238E27FC236}">
+                <a16:creationId xmlns:a16="http://schemas.microsoft.com/office/drawing/2014/main" id="{70F82797-C0E0-4392-94A6-0448EEE08AE1}"/>
+              </a:ext>
+            </a:extLst>
+          </p:cNvPr>
+          <p:cNvPicPr>
+            <a:picLocks noChangeAspect="1" noChangeArrowheads="1"/>
+          </p:cNvPicPr>
+          <p:nvPr/>
+        </p:nvPicPr>
+        <p:blipFill>
+          <a:blip r:embed="rId16">
+            <a:extLst>
+              <a:ext uri="{28A0092B-C50C-407E-A947-70E740481C1C}">
+                <a14:useLocalDpi xmlns:a14="http://schemas.microsoft.com/office/drawing/2010/main" val="0"/>
+              </a:ext>
+            </a:extLst>
+          </a:blip>
+          <a:srcRect/>
+          <a:stretch>
+            <a:fillRect/>
+          </a:stretch>
+        </p:blipFill>
+        <p:spPr bwMode="auto">
+          <a:xfrm>
+            <a:off x="2045738" y="5188014"/>
+            <a:ext cx="727402" cy="235405"/>
+          </a:xfrm>
+          <a:prstGeom prst="rect">
+            <a:avLst/>
+          </a:prstGeom>
+          <a:noFill/>
+          <a:extLst>
+            <a:ext uri="{909E8E84-426E-40DD-AFC4-6F175D3DCCD1}">
+              <a14:hiddenFill xmlns:a14="http://schemas.microsoft.com/office/drawing/2010/main">
+                <a:solidFill>
+                  <a:srgbClr val="FFFFFF"/>
+                </a:solidFill>
+              </a14:hiddenFill>
+            </a:ext>
+          </a:extLst>
+        </p:spPr>
+      </p:pic>
+      <p:pic>
+        <p:nvPicPr>
+          <p:cNvPr id="1046" name="Picture 22" descr="Diseño Web (HTML5, CSS, JS) ~ Bienvenido Aprendamos Juntos">
+            <a:extLst>
+              <a:ext uri="{FF2B5EF4-FFF2-40B4-BE49-F238E27FC236}">
+                <a16:creationId xmlns:a16="http://schemas.microsoft.com/office/drawing/2014/main" id="{26360320-DAFC-438C-80AF-B20E604A1C7A}"/>
+              </a:ext>
+            </a:extLst>
+          </p:cNvPr>
+          <p:cNvPicPr>
+            <a:picLocks noChangeAspect="1" noChangeArrowheads="1"/>
+          </p:cNvPicPr>
+          <p:nvPr/>
+        </p:nvPicPr>
+        <p:blipFill>
+          <a:blip r:embed="rId17">
+            <a:extLst>
+              <a:ext uri="{28A0092B-C50C-407E-A947-70E740481C1C}">
+                <a14:useLocalDpi xmlns:a14="http://schemas.microsoft.com/office/drawing/2010/main" val="0"/>
+              </a:ext>
+            </a:extLst>
+          </a:blip>
+          <a:srcRect/>
+          <a:stretch>
+            <a:fillRect/>
+          </a:stretch>
+        </p:blipFill>
+        <p:spPr bwMode="auto">
+          <a:xfrm>
+            <a:off x="3365886" y="4073806"/>
+            <a:ext cx="894261" cy="523981"/>
+          </a:xfrm>
+          <a:prstGeom prst="rect">
+            <a:avLst/>
+          </a:prstGeom>
+          <a:noFill/>
+          <a:extLst>
+            <a:ext uri="{909E8E84-426E-40DD-AFC4-6F175D3DCCD1}">
+              <a14:hiddenFill xmlns:a14="http://schemas.microsoft.com/office/drawing/2010/main">
+                <a:solidFill>
+                  <a:srgbClr val="FFFFFF"/>
+                </a:solidFill>
+              </a14:hiddenFill>
+            </a:ext>
+          </a:extLst>
+        </p:spPr>
+      </p:pic>
+      <p:pic>
+        <p:nvPicPr>
+          <p:cNvPr id="1054" name="Picture 30" descr="True/False Question | H5P">
+            <a:extLst>
+              <a:ext uri="{FF2B5EF4-FFF2-40B4-BE49-F238E27FC236}">
+                <a16:creationId xmlns:a16="http://schemas.microsoft.com/office/drawing/2014/main" id="{56E13F6F-4134-4A6C-A7B8-B8B8EE1E689E}"/>
+              </a:ext>
+            </a:extLst>
+          </p:cNvPr>
+          <p:cNvPicPr>
+            <a:picLocks noChangeAspect="1" noChangeArrowheads="1"/>
+          </p:cNvPicPr>
+          <p:nvPr/>
+        </p:nvPicPr>
+        <p:blipFill rotWithShape="1">
+          <a:blip r:embed="rId18">
+            <a:extLst>
+              <a:ext uri="{28A0092B-C50C-407E-A947-70E740481C1C}">
+                <a14:useLocalDpi xmlns:a14="http://schemas.microsoft.com/office/drawing/2010/main" val="0"/>
+              </a:ext>
+            </a:extLst>
+          </a:blip>
+          <a:srcRect l="13060" t="6438" r="12308" b="9418"/>
+          <a:stretch/>
+        </p:blipFill>
+        <p:spPr bwMode="auto">
+          <a:xfrm>
+            <a:off x="3762374" y="5902763"/>
+            <a:ext cx="434921" cy="367757"/>
+          </a:xfrm>
+          <a:prstGeom prst="rect">
+            <a:avLst/>
+          </a:prstGeom>
+          <a:noFill/>
+          <a:extLst>
+            <a:ext uri="{909E8E84-426E-40DD-AFC4-6F175D3DCCD1}">
+              <a14:hiddenFill xmlns:a14="http://schemas.microsoft.com/office/drawing/2010/main">
+                <a:solidFill>
+                  <a:srgbClr val="FFFFFF"/>
+                </a:solidFill>
+              </a14:hiddenFill>
+            </a:ext>
+          </a:extLst>
+        </p:spPr>
+      </p:pic>
+      <p:pic>
+        <p:nvPicPr>
+          <p:cNvPr id="4098" name="Picture 2" descr="Step 1 Images – Browse 512,945 Stock Photos, Vectors, and Video | Adobe  Stock">
+            <a:extLst>
+              <a:ext uri="{FF2B5EF4-FFF2-40B4-BE49-F238E27FC236}">
+                <a16:creationId xmlns:a16="http://schemas.microsoft.com/office/drawing/2014/main" id="{E38E6ABB-936F-4B4D-971A-4E08411E5E5E}"/>
+              </a:ext>
+            </a:extLst>
+          </p:cNvPr>
+          <p:cNvPicPr>
+            <a:picLocks noChangeAspect="1" noChangeArrowheads="1"/>
+          </p:cNvPicPr>
+          <p:nvPr/>
+        </p:nvPicPr>
+        <p:blipFill rotWithShape="1">
+          <a:blip r:embed="rId19">
+            <a:extLst>
+              <a:ext uri="{28A0092B-C50C-407E-A947-70E740481C1C}">
+                <a14:useLocalDpi xmlns:a14="http://schemas.microsoft.com/office/drawing/2010/main" val="0"/>
+              </a:ext>
+            </a:extLst>
+          </a:blip>
+          <a:srcRect l="25694" t="7083" r="17351" b="67210"/>
+          <a:stretch/>
+        </p:blipFill>
+        <p:spPr bwMode="auto">
+          <a:xfrm>
+            <a:off x="194605" y="3058775"/>
+            <a:ext cx="1430357" cy="645606"/>
+          </a:xfrm>
+          <a:prstGeom prst="rect">
+            <a:avLst/>
+          </a:prstGeom>
+          <a:noFill/>
+          <a:extLst>
+            <a:ext uri="{909E8E84-426E-40DD-AFC4-6F175D3DCCD1}">
+              <a14:hiddenFill xmlns:a14="http://schemas.microsoft.com/office/drawing/2010/main">
+                <a:solidFill>
+                  <a:srgbClr val="FFFFFF"/>
+                </a:solidFill>
+              </a14:hiddenFill>
+            </a:ext>
+          </a:extLst>
+        </p:spPr>
+      </p:pic>
+      <p:pic>
+        <p:nvPicPr>
+          <p:cNvPr id="35" name="Picture 2" descr="Step 1 Images – Browse 512,945 Stock Photos, Vectors, and Video | Adobe  Stock">
+            <a:extLst>
+              <a:ext uri="{FF2B5EF4-FFF2-40B4-BE49-F238E27FC236}">
+                <a16:creationId xmlns:a16="http://schemas.microsoft.com/office/drawing/2014/main" id="{D7C87E4C-0539-461C-9D33-60F46FB439EF}"/>
+              </a:ext>
+            </a:extLst>
+          </p:cNvPr>
+          <p:cNvPicPr>
+            <a:picLocks noChangeAspect="1" noChangeArrowheads="1"/>
+          </p:cNvPicPr>
+          <p:nvPr/>
+        </p:nvPicPr>
+        <p:blipFill rotWithShape="1">
+          <a:blip r:embed="rId19">
+            <a:extLst>
+              <a:ext uri="{28A0092B-C50C-407E-A947-70E740481C1C}">
+                <a14:useLocalDpi xmlns:a14="http://schemas.microsoft.com/office/drawing/2010/main" val="0"/>
+              </a:ext>
+            </a:extLst>
+          </a:blip>
+          <a:srcRect l="25924" t="36732" r="15646" b="36367"/>
+          <a:stretch/>
+        </p:blipFill>
+        <p:spPr bwMode="auto">
+          <a:xfrm>
+            <a:off x="6561047" y="24426"/>
+            <a:ext cx="1236474" cy="569279"/>
+          </a:xfrm>
+          <a:prstGeom prst="rect">
+            <a:avLst/>
+          </a:prstGeom>
+          <a:noFill/>
+          <a:extLst>
+            <a:ext uri="{909E8E84-426E-40DD-AFC4-6F175D3DCCD1}">
+              <a14:hiddenFill xmlns:a14="http://schemas.microsoft.com/office/drawing/2010/main">
+                <a:solidFill>
+                  <a:srgbClr val="FFFFFF"/>
+                </a:solidFill>
+              </a14:hiddenFill>
+            </a:ext>
+          </a:extLst>
+        </p:spPr>
+      </p:pic>
+      <p:pic>
+        <p:nvPicPr>
+          <p:cNvPr id="36" name="Picture 2" descr="Step 1 Images – Browse 512,945 Stock Photos, Vectors, and Video | Adobe  Stock">
+            <a:extLst>
+              <a:ext uri="{FF2B5EF4-FFF2-40B4-BE49-F238E27FC236}">
+                <a16:creationId xmlns:a16="http://schemas.microsoft.com/office/drawing/2014/main" id="{7717FB8F-E046-4722-953C-4B66B62CFBDC}"/>
+              </a:ext>
+            </a:extLst>
+          </p:cNvPr>
+          <p:cNvPicPr>
+            <a:picLocks noChangeAspect="1" noChangeArrowheads="1"/>
+          </p:cNvPicPr>
+          <p:nvPr/>
+        </p:nvPicPr>
+        <p:blipFill rotWithShape="1">
+          <a:blip r:embed="rId19">
+            <a:extLst>
+              <a:ext uri="{28A0092B-C50C-407E-A947-70E740481C1C}">
+                <a14:useLocalDpi xmlns:a14="http://schemas.microsoft.com/office/drawing/2010/main" val="0"/>
+              </a:ext>
+            </a:extLst>
+          </a:blip>
+          <a:srcRect l="26041" t="64220" r="16695" b="8889"/>
+          <a:stretch/>
+        </p:blipFill>
+        <p:spPr bwMode="auto">
+          <a:xfrm>
+            <a:off x="146435" y="6223392"/>
+            <a:ext cx="1218886" cy="572400"/>
+          </a:xfrm>
+          <a:prstGeom prst="rect">
+            <a:avLst/>
+          </a:prstGeom>
+          <a:noFill/>
+          <a:extLst>
+            <a:ext uri="{909E8E84-426E-40DD-AFC4-6F175D3DCCD1}">
+              <a14:hiddenFill xmlns:a14="http://schemas.microsoft.com/office/drawing/2010/main">
+                <a:solidFill>
+                  <a:srgbClr val="FFFFFF"/>
+                </a:solidFill>
+              </a14:hiddenFill>
+            </a:ext>
+          </a:extLst>
+        </p:spPr>
+      </p:pic>
+      <p:pic>
+        <p:nvPicPr>
+          <p:cNvPr id="5122" name="Picture 2" descr="Browser - Free seo and web icons">
+            <a:extLst>
+              <a:ext uri="{FF2B5EF4-FFF2-40B4-BE49-F238E27FC236}">
+                <a16:creationId xmlns:a16="http://schemas.microsoft.com/office/drawing/2014/main" id="{24FC662C-9F30-4786-8AA4-CDFAD06BFFEB}"/>
+              </a:ext>
+            </a:extLst>
+          </p:cNvPr>
+          <p:cNvPicPr>
+            <a:picLocks noChangeAspect="1" noChangeArrowheads="1"/>
+          </p:cNvPicPr>
+          <p:nvPr/>
+        </p:nvPicPr>
+        <p:blipFill>
+          <a:blip r:embed="rId20">
+            <a:extLst>
+              <a:ext uri="{28A0092B-C50C-407E-A947-70E740481C1C}">
+                <a14:useLocalDpi xmlns:a14="http://schemas.microsoft.com/office/drawing/2010/main" val="0"/>
+              </a:ext>
+            </a:extLst>
+          </a:blip>
+          <a:srcRect/>
+          <a:stretch>
+            <a:fillRect/>
+          </a:stretch>
+        </p:blipFill>
+        <p:spPr bwMode="auto">
+          <a:xfrm>
+            <a:off x="1345828" y="4403262"/>
+            <a:ext cx="389049" cy="389049"/>
+          </a:xfrm>
+          <a:prstGeom prst="rect">
+            <a:avLst/>
+          </a:prstGeom>
+          <a:noFill/>
+          <a:extLst>
+            <a:ext uri="{909E8E84-426E-40DD-AFC4-6F175D3DCCD1}">
+              <a14:hiddenFill xmlns:a14="http://schemas.microsoft.com/office/drawing/2010/main">
+                <a:solidFill>
+                  <a:srgbClr val="FFFFFF"/>
+                </a:solidFill>
+              </a14:hiddenFill>
+            </a:ext>
+          </a:extLst>
+        </p:spPr>
+      </p:pic>
+      <p:sp>
+        <p:nvSpPr>
+          <p:cNvPr id="37" name="Marcador de contenido 2">
+            <a:extLst>
+              <a:ext uri="{FF2B5EF4-FFF2-40B4-BE49-F238E27FC236}">
+                <a16:creationId xmlns:a16="http://schemas.microsoft.com/office/drawing/2014/main" id="{D80CC176-DB0E-4B8E-BE32-0A48229AD171}"/>
+              </a:ext>
+            </a:extLst>
+          </p:cNvPr>
+          <p:cNvSpPr txBox="1">
+            <a:spLocks/>
+          </p:cNvSpPr>
+          <p:nvPr/>
+        </p:nvSpPr>
+        <p:spPr>
+          <a:xfrm>
+            <a:off x="74191" y="4379955"/>
+            <a:ext cx="389049" cy="230439"/>
+          </a:xfrm>
+          <a:prstGeom prst="rect">
+            <a:avLst/>
+          </a:prstGeom>
+        </p:spPr>
+        <p:txBody>
+          <a:bodyPr vert="horz" lIns="91440" tIns="45720" rIns="91440" bIns="45720" rtlCol="0">
+            <a:normAutofit fontScale="70000" lnSpcReduction="20000"/>
+          </a:bodyPr>
+          <a:lstStyle>
+            <a:lvl1pPr marL="228600" indent="-228600" algn="l" defTabSz="914400" rtl="0" eaLnBrk="1" latinLnBrk="0" hangingPunct="1">
+              <a:lnSpc>
+                <a:spcPct val="90000"/>
+              </a:lnSpc>
+              <a:spcBef>
+                <a:spcPts val="1000"/>
+              </a:spcBef>
+              <a:buFont typeface="Arial" panose="020B0604020202020204" pitchFamily="34" charset="0"/>
+              <a:buChar char="•"/>
+              <a:defRPr sz="2800" kern="1200">
+                <a:solidFill>
+                  <a:schemeClr val="tx1"/>
+                </a:solidFill>
+                <a:latin typeface="+mn-lt"/>
+                <a:ea typeface="+mn-ea"/>
+                <a:cs typeface="+mn-cs"/>
+              </a:defRPr>
+            </a:lvl1pPr>
+            <a:lvl2pPr marL="685800" indent="-228600" algn="l" defTabSz="914400" rtl="0" eaLnBrk="1" latinLnBrk="0" hangingPunct="1">
+              <a:lnSpc>
+                <a:spcPct val="90000"/>
+              </a:lnSpc>
+              <a:spcBef>
+                <a:spcPts val="500"/>
+              </a:spcBef>
+              <a:buFont typeface="Arial" panose="020B0604020202020204" pitchFamily="34" charset="0"/>
+              <a:buChar char="•"/>
+              <a:defRPr sz="2400" kern="1200">
+                <a:solidFill>
+                  <a:schemeClr val="tx1"/>
+                </a:solidFill>
+                <a:latin typeface="+mn-lt"/>
+                <a:ea typeface="+mn-ea"/>
+                <a:cs typeface="+mn-cs"/>
+              </a:defRPr>
+            </a:lvl2pPr>
+            <a:lvl3pPr marL="1143000" indent="-228600" algn="l" defTabSz="914400" rtl="0" eaLnBrk="1" latinLnBrk="0" hangingPunct="1">
+              <a:lnSpc>
+                <a:spcPct val="90000"/>
+              </a:lnSpc>
+              <a:spcBef>
+                <a:spcPts val="500"/>
+              </a:spcBef>
+              <a:buFont typeface="Arial" panose="020B0604020202020204" pitchFamily="34" charset="0"/>
+              <a:buChar char="•"/>
+              <a:defRPr sz="2000" kern="1200">
+                <a:solidFill>
+                  <a:schemeClr val="tx1"/>
+                </a:solidFill>
+                <a:latin typeface="+mn-lt"/>
+                <a:ea typeface="+mn-ea"/>
+                <a:cs typeface="+mn-cs"/>
+              </a:defRPr>
+            </a:lvl3pPr>
+            <a:lvl4pPr marL="1600200" indent="-228600" algn="l" defTabSz="914400" rtl="0" eaLnBrk="1" latinLnBrk="0" hangingPunct="1">
+              <a:lnSpc>
+                <a:spcPct val="90000"/>
+              </a:lnSpc>
+              <a:spcBef>
+                <a:spcPts val="500"/>
+              </a:spcBef>
+              <a:buFont typeface="Arial" panose="020B0604020202020204" pitchFamily="34" charset="0"/>
+              <a:buChar char="•"/>
+              <a:defRPr sz="1800" kern="1200">
+                <a:solidFill>
+                  <a:schemeClr val="tx1"/>
+                </a:solidFill>
+                <a:latin typeface="+mn-lt"/>
+                <a:ea typeface="+mn-ea"/>
+                <a:cs typeface="+mn-cs"/>
+              </a:defRPr>
+            </a:lvl4pPr>
+            <a:lvl5pPr marL="2057400" indent="-228600" algn="l" defTabSz="914400" rtl="0" eaLnBrk="1" latinLnBrk="0" hangingPunct="1">
+              <a:lnSpc>
+                <a:spcPct val="90000"/>
+              </a:lnSpc>
+              <a:spcBef>
+                <a:spcPts val="500"/>
+              </a:spcBef>
+              <a:buFont typeface="Arial" panose="020B0604020202020204" pitchFamily="34" charset="0"/>
+              <a:buChar char="•"/>
+              <a:defRPr sz="1800" kern="1200">
+                <a:solidFill>
+                  <a:schemeClr val="tx1"/>
+                </a:solidFill>
+                <a:latin typeface="+mn-lt"/>
+                <a:ea typeface="+mn-ea"/>
+                <a:cs typeface="+mn-cs"/>
+              </a:defRPr>
+            </a:lvl5pPr>
+            <a:lvl6pPr marL="2514600" indent="-228600" algn="l" defTabSz="914400" rtl="0" eaLnBrk="1" latinLnBrk="0" hangingPunct="1">
+              <a:lnSpc>
+                <a:spcPct val="90000"/>
+              </a:lnSpc>
+              <a:spcBef>
+                <a:spcPts val="500"/>
+              </a:spcBef>
+              <a:buFont typeface="Arial" panose="020B0604020202020204" pitchFamily="34" charset="0"/>
+              <a:buChar char="•"/>
+              <a:defRPr sz="1800" kern="1200">
+                <a:solidFill>
+                  <a:schemeClr val="tx1"/>
+                </a:solidFill>
+                <a:latin typeface="+mn-lt"/>
+                <a:ea typeface="+mn-ea"/>
+                <a:cs typeface="+mn-cs"/>
+              </a:defRPr>
+            </a:lvl6pPr>
+            <a:lvl7pPr marL="2971800" indent="-228600" algn="l" defTabSz="914400" rtl="0" eaLnBrk="1" latinLnBrk="0" hangingPunct="1">
+              <a:lnSpc>
+                <a:spcPct val="90000"/>
+              </a:lnSpc>
+              <a:spcBef>
+                <a:spcPts val="500"/>
+              </a:spcBef>
+              <a:buFont typeface="Arial" panose="020B0604020202020204" pitchFamily="34" charset="0"/>
+              <a:buChar char="•"/>
+              <a:defRPr sz="1800" kern="1200">
+                <a:solidFill>
+                  <a:schemeClr val="tx1"/>
+                </a:solidFill>
+                <a:latin typeface="+mn-lt"/>
+                <a:ea typeface="+mn-ea"/>
+                <a:cs typeface="+mn-cs"/>
+              </a:defRPr>
+            </a:lvl7pPr>
+            <a:lvl8pPr marL="3429000" indent="-228600" algn="l" defTabSz="914400" rtl="0" eaLnBrk="1" latinLnBrk="0" hangingPunct="1">
+              <a:lnSpc>
+                <a:spcPct val="90000"/>
+              </a:lnSpc>
+              <a:spcBef>
+                <a:spcPts val="500"/>
+              </a:spcBef>
+              <a:buFont typeface="Arial" panose="020B0604020202020204" pitchFamily="34" charset="0"/>
+              <a:buChar char="•"/>
+              <a:defRPr sz="1800" kern="1200">
+                <a:solidFill>
+                  <a:schemeClr val="tx1"/>
+                </a:solidFill>
+                <a:latin typeface="+mn-lt"/>
+                <a:ea typeface="+mn-ea"/>
+                <a:cs typeface="+mn-cs"/>
+              </a:defRPr>
+            </a:lvl8pPr>
+            <a:lvl9pPr marL="3886200" indent="-228600" algn="l" defTabSz="914400" rtl="0" eaLnBrk="1" latinLnBrk="0" hangingPunct="1">
+              <a:lnSpc>
+                <a:spcPct val="90000"/>
+              </a:lnSpc>
+              <a:spcBef>
+                <a:spcPts val="500"/>
+              </a:spcBef>
+              <a:buFont typeface="Arial" panose="020B0604020202020204" pitchFamily="34" charset="0"/>
+              <a:buChar char="•"/>
+              <a:defRPr sz="1800" kern="1200">
+                <a:solidFill>
+                  <a:schemeClr val="tx1"/>
+                </a:solidFill>
+                <a:latin typeface="+mn-lt"/>
+                <a:ea typeface="+mn-ea"/>
+                <a:cs typeface="+mn-cs"/>
+              </a:defRPr>
+            </a:lvl9pPr>
+          </a:lstStyle>
+          <a:p>
+            <a:pPr marL="0" indent="0">
+              <a:buFont typeface="Arial" panose="020B0604020202020204" pitchFamily="34" charset="0"/>
+              <a:buNone/>
+            </a:pPr>
+            <a:r>
+              <a:rPr lang="es-MX" sz="1100" dirty="0" err="1">
+                <a:solidFill>
+                  <a:srgbClr val="7030A0"/>
+                </a:solidFill>
+              </a:rPr>
+              <a:t>User</a:t>
+            </a:r>
+            <a:endParaRPr lang="es-MX" sz="1100" dirty="0">
+              <a:solidFill>
+                <a:srgbClr val="7030A0"/>
+              </a:solidFill>
+            </a:endParaRPr>
+          </a:p>
+        </p:txBody>
+      </p:sp>
+    </p:spTree>
+    <p:extLst>
+      <p:ext uri="{BB962C8B-B14F-4D97-AF65-F5344CB8AC3E}">
+        <p14:creationId xmlns:p14="http://schemas.microsoft.com/office/powerpoint/2010/main" val="854304995"/>
+      </p:ext>
+    </p:extLst>
+  </p:cSld>
+  <p:clrMapOvr>
+    <a:masterClrMapping/>
+  </p:clrMapOvr>
+</p:sld>
+</file>
+
+<file path=ppt/slides/slide9.xml><?xml version="1.0" encoding="utf-8"?>
+<p:sld xmlns:a="http://schemas.openxmlformats.org/drawingml/2006/main" xmlns:r="http://schemas.openxmlformats.org/officeDocument/2006/relationships" xmlns:p="http://schemas.openxmlformats.org/presentationml/2006/main">
+  <p:cSld>
+    <p:spTree>
+      <p:nvGrpSpPr>
+        <p:cNvPr id="1" name=""/>
+        <p:cNvGrpSpPr/>
+        <p:nvPr/>
+      </p:nvGrpSpPr>
+      <p:grpSpPr>
+        <a:xfrm>
+          <a:off x="0" y="0"/>
+          <a:ext cx="0" cy="0"/>
+          <a:chOff x="0" y="0"/>
+          <a:chExt cx="0" cy="0"/>
+        </a:xfrm>
+      </p:grpSpPr>
       <p:sp>
         <p:nvSpPr>
           <p:cNvPr id="2" name="Título 1">

</xml_diff>

<commit_message>
Update figures and revise methodology
Original Comment:
"Comment n.5 Figures

Figure 1 and 2 has been improved with an adequate international standard, while figure n.3 contains some graphical – images – informal elements that decrease the clarity of content exposition and reduced the figure standard.

Figure 6 and 7 have to be substituted with new onces or re-shaped, in order to respect the page size and standard, and at the same time the readability of the content, showing only the essential contents useful to capture the reader attention."

Solution:
Replaced component, sequence, and system architecture diagrams with updated images. Revised the methodology section to correct dataset counts, improve clarity, and reorganize the explanation of system architecture and workflow. Adjusted figure references and formatting for consistency.
</commit_message>
<xml_diff>
--- a/MDPI_template/MDPI_template/Figures/figura1.pptx
+++ b/MDPI_template/MDPI_template/Figures/figura1.pptx
@@ -118,6 +118,725 @@
     </p:ext>
   </p:extLst>
 </p:presentation>
+</file>
+
+<file path=ppt/charts/chart1.xml><?xml version="1.0" encoding="utf-8"?>
+<c:chartSpace xmlns:c="http://schemas.openxmlformats.org/drawingml/2006/chart" xmlns:a="http://schemas.openxmlformats.org/drawingml/2006/main" xmlns:r="http://schemas.openxmlformats.org/officeDocument/2006/relationships" xmlns:c16r2="http://schemas.microsoft.com/office/drawing/2015/06/chart">
+  <c:date1904 val="0"/>
+  <c:lang val="es-ES"/>
+  <c:roundedCorners val="0"/>
+  <mc:AlternateContent xmlns:mc="http://schemas.openxmlformats.org/markup-compatibility/2006">
+    <mc:Choice xmlns:c14="http://schemas.microsoft.com/office/drawing/2007/8/2/chart" Requires="c14">
+      <c14:style val="102"/>
+    </mc:Choice>
+    <mc:Fallback>
+      <c:style val="2"/>
+    </mc:Fallback>
+  </mc:AlternateContent>
+  <c:chart>
+    <c:autoTitleDeleted val="1"/>
+    <c:plotArea>
+      <c:layout>
+        <c:manualLayout>
+          <c:layoutTarget val="inner"/>
+          <c:xMode val="edge"/>
+          <c:yMode val="edge"/>
+          <c:x val="0.26693058897268446"/>
+          <c:y val="7.6600357238561428E-2"/>
+          <c:w val="0.71264603004508786"/>
+          <c:h val="0.75925602010737836"/>
+        </c:manualLayout>
+      </c:layout>
+      <c:pieChart>
+        <c:varyColors val="1"/>
+        <c:ser>
+          <c:idx val="0"/>
+          <c:order val="0"/>
+          <c:explosion val="6"/>
+          <c:dPt>
+            <c:idx val="0"/>
+            <c:bubble3D val="0"/>
+            <c:spPr>
+              <a:solidFill>
+                <a:srgbClr val="006BCC"/>
+              </a:solidFill>
+              <a:ln w="19050">
+                <a:solidFill>
+                  <a:schemeClr val="lt1"/>
+                </a:solidFill>
+              </a:ln>
+              <a:effectLst/>
+            </c:spPr>
+            <c:extLst>
+              <c:ext xmlns:c16="http://schemas.microsoft.com/office/drawing/2014/chart" uri="{C3380CC4-5D6E-409C-BE32-E72D297353CC}">
+                <c16:uniqueId val="{00000001-0818-499A-8ECA-17D5A9C52A6C}"/>
+              </c:ext>
+            </c:extLst>
+          </c:dPt>
+          <c:dPt>
+            <c:idx val="1"/>
+            <c:bubble3D val="0"/>
+            <c:spPr>
+              <a:solidFill>
+                <a:srgbClr val="660066"/>
+              </a:solidFill>
+              <a:ln w="19050">
+                <a:solidFill>
+                  <a:schemeClr val="lt1"/>
+                </a:solidFill>
+              </a:ln>
+              <a:effectLst/>
+            </c:spPr>
+            <c:extLst>
+              <c:ext xmlns:c16="http://schemas.microsoft.com/office/drawing/2014/chart" uri="{C3380CC4-5D6E-409C-BE32-E72D297353CC}">
+                <c16:uniqueId val="{00000003-0818-499A-8ECA-17D5A9C52A6C}"/>
+              </c:ext>
+            </c:extLst>
+          </c:dPt>
+          <c:dPt>
+            <c:idx val="2"/>
+            <c:bubble3D val="0"/>
+            <c:spPr>
+              <a:solidFill>
+                <a:srgbClr val="F1C1F0"/>
+              </a:solidFill>
+              <a:ln w="19050">
+                <a:solidFill>
+                  <a:schemeClr val="lt1"/>
+                </a:solidFill>
+              </a:ln>
+              <a:effectLst/>
+            </c:spPr>
+            <c:extLst>
+              <c:ext xmlns:c16="http://schemas.microsoft.com/office/drawing/2014/chart" uri="{C3380CC4-5D6E-409C-BE32-E72D297353CC}">
+                <c16:uniqueId val="{00000005-0818-499A-8ECA-17D5A9C52A6C}"/>
+              </c:ext>
+            </c:extLst>
+          </c:dPt>
+          <c:val>
+            <c:numRef>
+              <c:f>Hoja1!$A$1:$A$3</c:f>
+              <c:numCache>
+                <c:formatCode>General</c:formatCode>
+                <c:ptCount val="3"/>
+                <c:pt idx="0">
+                  <c:v>70</c:v>
+                </c:pt>
+                <c:pt idx="1">
+                  <c:v>20</c:v>
+                </c:pt>
+                <c:pt idx="2">
+                  <c:v>10</c:v>
+                </c:pt>
+              </c:numCache>
+            </c:numRef>
+          </c:val>
+          <c:extLst>
+            <c:ext xmlns:c16="http://schemas.microsoft.com/office/drawing/2014/chart" uri="{C3380CC4-5D6E-409C-BE32-E72D297353CC}">
+              <c16:uniqueId val="{00000006-0818-499A-8ECA-17D5A9C52A6C}"/>
+            </c:ext>
+          </c:extLst>
+        </c:ser>
+        <c:dLbls>
+          <c:showLegendKey val="0"/>
+          <c:showVal val="0"/>
+          <c:showCatName val="0"/>
+          <c:showSerName val="0"/>
+          <c:showPercent val="0"/>
+          <c:showBubbleSize val="0"/>
+          <c:showLeaderLines val="1"/>
+        </c:dLbls>
+        <c:firstSliceAng val="0"/>
+      </c:pieChart>
+      <c:spPr>
+        <a:noFill/>
+        <a:ln>
+          <a:noFill/>
+        </a:ln>
+        <a:effectLst/>
+      </c:spPr>
+    </c:plotArea>
+    <c:plotVisOnly val="1"/>
+    <c:dispBlanksAs val="gap"/>
+    <c:showDLblsOverMax val="0"/>
+  </c:chart>
+  <c:spPr>
+    <a:noFill/>
+    <a:ln>
+      <a:noFill/>
+    </a:ln>
+    <a:effectLst/>
+  </c:spPr>
+  <c:txPr>
+    <a:bodyPr/>
+    <a:lstStyle/>
+    <a:p>
+      <a:pPr>
+        <a:defRPr/>
+      </a:pPr>
+      <a:endParaRPr lang="es-MX"/>
+    </a:p>
+  </c:txPr>
+  <c:externalData r:id="rId3">
+    <c:autoUpdate val="0"/>
+  </c:externalData>
+</c:chartSpace>
+</file>
+
+<file path=ppt/charts/colors1.xml><?xml version="1.0" encoding="utf-8"?>
+<cs:colorStyle xmlns:cs="http://schemas.microsoft.com/office/drawing/2012/chartStyle" xmlns:a="http://schemas.openxmlformats.org/drawingml/2006/main" meth="cycle" id="13">
+  <a:schemeClr val="accent6"/>
+  <a:schemeClr val="accent5"/>
+  <a:schemeClr val="accent4"/>
+  <cs:variation/>
+  <cs:variation>
+    <a:lumMod val="60000"/>
+  </cs:variation>
+  <cs:variation>
+    <a:lumMod val="80000"/>
+    <a:lumOff val="20000"/>
+  </cs:variation>
+  <cs:variation>
+    <a:lumMod val="80000"/>
+  </cs:variation>
+  <cs:variation>
+    <a:lumMod val="60000"/>
+    <a:lumOff val="40000"/>
+  </cs:variation>
+  <cs:variation>
+    <a:lumMod val="50000"/>
+  </cs:variation>
+  <cs:variation>
+    <a:lumMod val="70000"/>
+    <a:lumOff val="30000"/>
+  </cs:variation>
+  <cs:variation>
+    <a:lumMod val="70000"/>
+  </cs:variation>
+  <cs:variation>
+    <a:lumMod val="50000"/>
+    <a:lumOff val="50000"/>
+  </cs:variation>
+</cs:colorStyle>
+</file>
+
+<file path=ppt/charts/style1.xml><?xml version="1.0" encoding="utf-8"?>
+<cs:chartStyle xmlns:cs="http://schemas.microsoft.com/office/drawing/2012/chartStyle" xmlns:a="http://schemas.openxmlformats.org/drawingml/2006/main" id="251">
+  <cs:axisTitle>
+    <cs:lnRef idx="0"/>
+    <cs:fillRef idx="0"/>
+    <cs:effectRef idx="0"/>
+    <cs:fontRef idx="minor">
+      <a:schemeClr val="tx1">
+        <a:lumMod val="65000"/>
+        <a:lumOff val="35000"/>
+      </a:schemeClr>
+    </cs:fontRef>
+    <cs:defRPr sz="1000" kern="1200"/>
+  </cs:axisTitle>
+  <cs:categoryAxis>
+    <cs:lnRef idx="0"/>
+    <cs:fillRef idx="0"/>
+    <cs:effectRef idx="0"/>
+    <cs:fontRef idx="minor">
+      <a:schemeClr val="tx1">
+        <a:lumMod val="65000"/>
+        <a:lumOff val="35000"/>
+      </a:schemeClr>
+    </cs:fontRef>
+    <cs:spPr>
+      <a:ln w="9525" cap="flat" cmpd="sng" algn="ctr">
+        <a:solidFill>
+          <a:schemeClr val="tx1">
+            <a:lumMod val="15000"/>
+            <a:lumOff val="85000"/>
+          </a:schemeClr>
+        </a:solidFill>
+        <a:round/>
+      </a:ln>
+    </cs:spPr>
+    <cs:defRPr sz="900" kern="1200"/>
+  </cs:categoryAxis>
+  <cs:chartArea mods="allowNoFillOverride allowNoLineOverride">
+    <cs:lnRef idx="0"/>
+    <cs:fillRef idx="0"/>
+    <cs:effectRef idx="0"/>
+    <cs:fontRef idx="minor">
+      <a:schemeClr val="tx1"/>
+    </cs:fontRef>
+    <cs:spPr>
+      <a:solidFill>
+        <a:schemeClr val="bg1"/>
+      </a:solidFill>
+      <a:ln w="9525" cap="flat" cmpd="sng" algn="ctr">
+        <a:solidFill>
+          <a:schemeClr val="tx1">
+            <a:lumMod val="15000"/>
+            <a:lumOff val="85000"/>
+          </a:schemeClr>
+        </a:solidFill>
+        <a:round/>
+      </a:ln>
+    </cs:spPr>
+    <cs:defRPr sz="900" kern="1200"/>
+  </cs:chartArea>
+  <cs:dataLabel>
+    <cs:lnRef idx="0"/>
+    <cs:fillRef idx="0"/>
+    <cs:effectRef idx="0"/>
+    <cs:fontRef idx="minor">
+      <a:schemeClr val="tx1">
+        <a:lumMod val="75000"/>
+        <a:lumOff val="25000"/>
+      </a:schemeClr>
+    </cs:fontRef>
+    <cs:defRPr sz="900" kern="1200"/>
+  </cs:dataLabel>
+  <cs:dataLabelCallout>
+    <cs:lnRef idx="0"/>
+    <cs:fillRef idx="0"/>
+    <cs:effectRef idx="0"/>
+    <cs:fontRef idx="minor">
+      <a:schemeClr val="dk1">
+        <a:lumMod val="65000"/>
+        <a:lumOff val="35000"/>
+      </a:schemeClr>
+    </cs:fontRef>
+    <cs:spPr>
+      <a:solidFill>
+        <a:schemeClr val="lt1"/>
+      </a:solidFill>
+      <a:ln>
+        <a:solidFill>
+          <a:schemeClr val="dk1">
+            <a:lumMod val="25000"/>
+            <a:lumOff val="75000"/>
+          </a:schemeClr>
+        </a:solidFill>
+      </a:ln>
+    </cs:spPr>
+    <cs:defRPr sz="900" kern="1200"/>
+    <cs:bodyPr rot="0" spcFirstLastPara="1" vertOverflow="clip" horzOverflow="clip" vert="horz" wrap="square" lIns="36576" tIns="18288" rIns="36576" bIns="18288" anchor="ctr" anchorCtr="1">
+      <a:spAutoFit/>
+    </cs:bodyPr>
+  </cs:dataLabelCallout>
+  <cs:dataPoint>
+    <cs:lnRef idx="0"/>
+    <cs:fillRef idx="1">
+      <cs:styleClr val="auto"/>
+    </cs:fillRef>
+    <cs:effectRef idx="0"/>
+    <cs:fontRef idx="minor">
+      <a:schemeClr val="tx1"/>
+    </cs:fontRef>
+    <cs:spPr>
+      <a:ln w="19050">
+        <a:solidFill>
+          <a:schemeClr val="lt1"/>
+        </a:solidFill>
+      </a:ln>
+    </cs:spPr>
+  </cs:dataPoint>
+  <cs:dataPoint3D>
+    <cs:lnRef idx="0"/>
+    <cs:fillRef idx="1">
+      <cs:styleClr val="auto"/>
+    </cs:fillRef>
+    <cs:effectRef idx="0"/>
+    <cs:fontRef idx="minor">
+      <a:schemeClr val="tx1"/>
+    </cs:fontRef>
+    <cs:spPr>
+      <a:ln w="25400">
+        <a:solidFill>
+          <a:schemeClr val="lt1"/>
+        </a:solidFill>
+      </a:ln>
+    </cs:spPr>
+  </cs:dataPoint3D>
+  <cs:dataPointLine>
+    <cs:lnRef idx="0">
+      <cs:styleClr val="auto"/>
+    </cs:lnRef>
+    <cs:fillRef idx="0"/>
+    <cs:effectRef idx="0"/>
+    <cs:fontRef idx="minor">
+      <a:schemeClr val="tx1"/>
+    </cs:fontRef>
+    <cs:spPr>
+      <a:ln w="28575" cap="rnd">
+        <a:solidFill>
+          <a:schemeClr val="phClr"/>
+        </a:solidFill>
+        <a:round/>
+      </a:ln>
+    </cs:spPr>
+  </cs:dataPointLine>
+  <cs:dataPointMarker>
+    <cs:lnRef idx="0">
+      <cs:styleClr val="auto"/>
+    </cs:lnRef>
+    <cs:fillRef idx="1">
+      <cs:styleClr val="auto"/>
+    </cs:fillRef>
+    <cs:effectRef idx="0"/>
+    <cs:fontRef idx="minor">
+      <a:schemeClr val="tx1"/>
+    </cs:fontRef>
+    <cs:spPr>
+      <a:ln w="9525">
+        <a:solidFill>
+          <a:schemeClr val="phClr"/>
+        </a:solidFill>
+      </a:ln>
+    </cs:spPr>
+  </cs:dataPointMarker>
+  <cs:dataPointMarkerLayout symbol="circle" size="5"/>
+  <cs:dataPointWireframe>
+    <cs:lnRef idx="0">
+      <cs:styleClr val="auto"/>
+    </cs:lnRef>
+    <cs:fillRef idx="0"/>
+    <cs:effectRef idx="0"/>
+    <cs:fontRef idx="minor">
+      <a:schemeClr val="tx1"/>
+    </cs:fontRef>
+    <cs:spPr>
+      <a:ln w="9525" cap="rnd">
+        <a:solidFill>
+          <a:schemeClr val="phClr"/>
+        </a:solidFill>
+        <a:round/>
+      </a:ln>
+    </cs:spPr>
+  </cs:dataPointWireframe>
+  <cs:dataTable>
+    <cs:lnRef idx="0"/>
+    <cs:fillRef idx="0"/>
+    <cs:effectRef idx="0"/>
+    <cs:fontRef idx="minor">
+      <a:schemeClr val="tx1">
+        <a:lumMod val="65000"/>
+        <a:lumOff val="35000"/>
+      </a:schemeClr>
+    </cs:fontRef>
+    <cs:spPr>
+      <a:noFill/>
+      <a:ln w="9525" cap="flat" cmpd="sng" algn="ctr">
+        <a:solidFill>
+          <a:schemeClr val="tx1">
+            <a:lumMod val="15000"/>
+            <a:lumOff val="85000"/>
+          </a:schemeClr>
+        </a:solidFill>
+        <a:round/>
+      </a:ln>
+    </cs:spPr>
+    <cs:defRPr sz="900" kern="1200"/>
+  </cs:dataTable>
+  <cs:downBar>
+    <cs:lnRef idx="0"/>
+    <cs:fillRef idx="0"/>
+    <cs:effectRef idx="0"/>
+    <cs:fontRef idx="minor">
+      <a:schemeClr val="tx1"/>
+    </cs:fontRef>
+    <cs:spPr>
+      <a:solidFill>
+        <a:schemeClr val="dk1">
+          <a:lumMod val="75000"/>
+          <a:lumOff val="25000"/>
+        </a:schemeClr>
+      </a:solidFill>
+      <a:ln w="9525" cap="flat" cmpd="sng" algn="ctr">
+        <a:solidFill>
+          <a:schemeClr val="tx1">
+            <a:lumMod val="65000"/>
+            <a:lumOff val="35000"/>
+          </a:schemeClr>
+        </a:solidFill>
+        <a:round/>
+      </a:ln>
+    </cs:spPr>
+  </cs:downBar>
+  <cs:dropLine>
+    <cs:lnRef idx="0"/>
+    <cs:fillRef idx="0"/>
+    <cs:effectRef idx="0"/>
+    <cs:fontRef idx="minor">
+      <a:schemeClr val="tx1"/>
+    </cs:fontRef>
+    <cs:spPr>
+      <a:ln w="9525" cap="flat" cmpd="sng" algn="ctr">
+        <a:solidFill>
+          <a:schemeClr val="tx1">
+            <a:lumMod val="35000"/>
+            <a:lumOff val="65000"/>
+          </a:schemeClr>
+        </a:solidFill>
+        <a:round/>
+      </a:ln>
+    </cs:spPr>
+  </cs:dropLine>
+  <cs:errorBar>
+    <cs:lnRef idx="0"/>
+    <cs:fillRef idx="0"/>
+    <cs:effectRef idx="0"/>
+    <cs:fontRef idx="minor">
+      <a:schemeClr val="tx1"/>
+    </cs:fontRef>
+    <cs:spPr>
+      <a:ln w="9525" cap="flat" cmpd="sng" algn="ctr">
+        <a:solidFill>
+          <a:schemeClr val="tx1">
+            <a:lumMod val="65000"/>
+            <a:lumOff val="35000"/>
+          </a:schemeClr>
+        </a:solidFill>
+        <a:round/>
+      </a:ln>
+    </cs:spPr>
+  </cs:errorBar>
+  <cs:floor>
+    <cs:lnRef idx="0"/>
+    <cs:fillRef idx="0"/>
+    <cs:effectRef idx="0"/>
+    <cs:fontRef idx="minor">
+      <a:schemeClr val="tx1"/>
+    </cs:fontRef>
+    <cs:spPr>
+      <a:noFill/>
+      <a:ln>
+        <a:noFill/>
+      </a:ln>
+    </cs:spPr>
+  </cs:floor>
+  <cs:gridlineMajor>
+    <cs:lnRef idx="0"/>
+    <cs:fillRef idx="0"/>
+    <cs:effectRef idx="0"/>
+    <cs:fontRef idx="minor">
+      <a:schemeClr val="tx1"/>
+    </cs:fontRef>
+    <cs:spPr>
+      <a:ln w="9525" cap="flat" cmpd="sng" algn="ctr">
+        <a:solidFill>
+          <a:schemeClr val="tx1">
+            <a:lumMod val="15000"/>
+            <a:lumOff val="85000"/>
+          </a:schemeClr>
+        </a:solidFill>
+        <a:round/>
+      </a:ln>
+    </cs:spPr>
+  </cs:gridlineMajor>
+  <cs:gridlineMinor>
+    <cs:lnRef idx="0"/>
+    <cs:fillRef idx="0"/>
+    <cs:effectRef idx="0"/>
+    <cs:fontRef idx="minor">
+      <a:schemeClr val="tx1"/>
+    </cs:fontRef>
+    <cs:spPr>
+      <a:ln w="9525" cap="flat" cmpd="sng" algn="ctr">
+        <a:solidFill>
+          <a:schemeClr val="tx1">
+            <a:lumMod val="5000"/>
+            <a:lumOff val="95000"/>
+          </a:schemeClr>
+        </a:solidFill>
+        <a:round/>
+      </a:ln>
+    </cs:spPr>
+  </cs:gridlineMinor>
+  <cs:hiLoLine>
+    <cs:lnRef idx="0"/>
+    <cs:fillRef idx="0"/>
+    <cs:effectRef idx="0"/>
+    <cs:fontRef idx="minor">
+      <a:schemeClr val="tx1"/>
+    </cs:fontRef>
+    <cs:spPr>
+      <a:ln w="9525" cap="flat" cmpd="sng" algn="ctr">
+        <a:solidFill>
+          <a:schemeClr val="tx1">
+            <a:lumMod val="50000"/>
+            <a:lumOff val="50000"/>
+          </a:schemeClr>
+        </a:solidFill>
+        <a:round/>
+      </a:ln>
+    </cs:spPr>
+  </cs:hiLoLine>
+  <cs:leaderLine>
+    <cs:lnRef idx="0"/>
+    <cs:fillRef idx="0"/>
+    <cs:effectRef idx="0"/>
+    <cs:fontRef idx="minor">
+      <a:schemeClr val="tx1"/>
+    </cs:fontRef>
+    <cs:spPr>
+      <a:ln w="9525" cap="flat" cmpd="sng" algn="ctr">
+        <a:solidFill>
+          <a:schemeClr val="tx1">
+            <a:lumMod val="35000"/>
+            <a:lumOff val="65000"/>
+          </a:schemeClr>
+        </a:solidFill>
+        <a:round/>
+      </a:ln>
+    </cs:spPr>
+  </cs:leaderLine>
+  <cs:legend>
+    <cs:lnRef idx="0"/>
+    <cs:fillRef idx="0"/>
+    <cs:effectRef idx="0"/>
+    <cs:fontRef idx="minor">
+      <a:schemeClr val="tx1">
+        <a:lumMod val="65000"/>
+        <a:lumOff val="35000"/>
+      </a:schemeClr>
+    </cs:fontRef>
+    <cs:defRPr sz="900" kern="1200"/>
+  </cs:legend>
+  <cs:plotArea mods="allowNoFillOverride allowNoLineOverride">
+    <cs:lnRef idx="0"/>
+    <cs:fillRef idx="0"/>
+    <cs:effectRef idx="0"/>
+    <cs:fontRef idx="minor">
+      <a:schemeClr val="tx1"/>
+    </cs:fontRef>
+  </cs:plotArea>
+  <cs:plotArea3D mods="allowNoFillOverride allowNoLineOverride">
+    <cs:lnRef idx="0"/>
+    <cs:fillRef idx="0"/>
+    <cs:effectRef idx="0"/>
+    <cs:fontRef idx="minor">
+      <a:schemeClr val="tx1"/>
+    </cs:fontRef>
+  </cs:plotArea3D>
+  <cs:seriesAxis>
+    <cs:lnRef idx="0"/>
+    <cs:fillRef idx="0"/>
+    <cs:effectRef idx="0"/>
+    <cs:fontRef idx="minor">
+      <a:schemeClr val="tx1">
+        <a:lumMod val="65000"/>
+        <a:lumOff val="35000"/>
+      </a:schemeClr>
+    </cs:fontRef>
+    <cs:defRPr sz="900" kern="1200"/>
+  </cs:seriesAxis>
+  <cs:seriesLine>
+    <cs:lnRef idx="0"/>
+    <cs:fillRef idx="0"/>
+    <cs:effectRef idx="0"/>
+    <cs:fontRef idx="minor">
+      <a:schemeClr val="tx1"/>
+    </cs:fontRef>
+    <cs:spPr>
+      <a:ln w="9525" cap="flat" cmpd="sng" algn="ctr">
+        <a:solidFill>
+          <a:schemeClr val="tx1">
+            <a:lumMod val="35000"/>
+            <a:lumOff val="65000"/>
+          </a:schemeClr>
+        </a:solidFill>
+        <a:round/>
+      </a:ln>
+    </cs:spPr>
+  </cs:seriesLine>
+  <cs:title>
+    <cs:lnRef idx="0"/>
+    <cs:fillRef idx="0"/>
+    <cs:effectRef idx="0"/>
+    <cs:fontRef idx="minor">
+      <a:schemeClr val="tx1">
+        <a:lumMod val="65000"/>
+        <a:lumOff val="35000"/>
+      </a:schemeClr>
+    </cs:fontRef>
+    <cs:defRPr sz="1400" b="0" kern="1200" spc="0" baseline="0"/>
+  </cs:title>
+  <cs:trendline>
+    <cs:lnRef idx="0">
+      <cs:styleClr val="auto"/>
+    </cs:lnRef>
+    <cs:fillRef idx="0"/>
+    <cs:effectRef idx="0"/>
+    <cs:fontRef idx="minor">
+      <a:schemeClr val="tx1"/>
+    </cs:fontRef>
+    <cs:spPr>
+      <a:ln w="19050" cap="rnd">
+        <a:solidFill>
+          <a:schemeClr val="phClr"/>
+        </a:solidFill>
+        <a:prstDash val="sysDot"/>
+      </a:ln>
+    </cs:spPr>
+  </cs:trendline>
+  <cs:trendlineLabel>
+    <cs:lnRef idx="0"/>
+    <cs:fillRef idx="0"/>
+    <cs:effectRef idx="0"/>
+    <cs:fontRef idx="minor">
+      <a:schemeClr val="tx1">
+        <a:lumMod val="65000"/>
+        <a:lumOff val="35000"/>
+      </a:schemeClr>
+    </cs:fontRef>
+    <cs:defRPr sz="900" kern="1200"/>
+  </cs:trendlineLabel>
+  <cs:upBar>
+    <cs:lnRef idx="0"/>
+    <cs:fillRef idx="0"/>
+    <cs:effectRef idx="0"/>
+    <cs:fontRef idx="minor">
+      <a:schemeClr val="tx1"/>
+    </cs:fontRef>
+    <cs:spPr>
+      <a:solidFill>
+        <a:schemeClr val="lt1"/>
+      </a:solidFill>
+      <a:ln w="9525" cap="flat" cmpd="sng" algn="ctr">
+        <a:solidFill>
+          <a:schemeClr val="tx1">
+            <a:lumMod val="65000"/>
+            <a:lumOff val="35000"/>
+          </a:schemeClr>
+        </a:solidFill>
+        <a:round/>
+      </a:ln>
+    </cs:spPr>
+  </cs:upBar>
+  <cs:valueAxis>
+    <cs:lnRef idx="0"/>
+    <cs:fillRef idx="0"/>
+    <cs:effectRef idx="0"/>
+    <cs:fontRef idx="minor">
+      <a:schemeClr val="tx1">
+        <a:lumMod val="65000"/>
+        <a:lumOff val="35000"/>
+      </a:schemeClr>
+    </cs:fontRef>
+    <cs:defRPr sz="900" kern="1200"/>
+  </cs:valueAxis>
+  <cs:wall>
+    <cs:lnRef idx="0"/>
+    <cs:fillRef idx="0"/>
+    <cs:effectRef idx="0"/>
+    <cs:fontRef idx="minor">
+      <a:schemeClr val="tx1"/>
+    </cs:fontRef>
+    <cs:spPr>
+      <a:noFill/>
+      <a:ln>
+        <a:noFill/>
+      </a:ln>
+    </cs:spPr>
+  </cs:wall>
+</cs:chartStyle>
 </file>
 
 <file path=ppt/slideLayouts/slideLayout1.xml><?xml version="1.0" encoding="utf-8"?>
@@ -12439,10 +13158,10 @@
       </p:grpSpPr>
       <p:pic>
         <p:nvPicPr>
-          <p:cNvPr id="7" name="Imagen 6">
-            <a:extLst>
-              <a:ext uri="{FF2B5EF4-FFF2-40B4-BE49-F238E27FC236}">
-                <a16:creationId xmlns:a16="http://schemas.microsoft.com/office/drawing/2014/main" id="{1F59BC40-0591-4675-9CCB-D55648AE021F}"/>
+          <p:cNvPr id="54" name="Imagen 53">
+            <a:extLst>
+              <a:ext uri="{FF2B5EF4-FFF2-40B4-BE49-F238E27FC236}">
+                <a16:creationId xmlns:a16="http://schemas.microsoft.com/office/drawing/2014/main" id="{B8582416-C696-4470-83CE-D87FDB6FC5DF}"/>
               </a:ext>
             </a:extLst>
           </p:cNvPr>
@@ -12452,14 +13171,20 @@
           <p:nvPr/>
         </p:nvPicPr>
         <p:blipFill rotWithShape="1">
-          <a:blip r:embed="rId2"/>
-          <a:srcRect t="8982" b="8159"/>
+          <a:blip r:embed="rId2">
+            <a:extLst>
+              <a:ext uri="{28A0092B-C50C-407E-A947-70E740481C1C}">
+                <a14:useLocalDpi xmlns:a14="http://schemas.microsoft.com/office/drawing/2010/main" val="0"/>
+              </a:ext>
+            </a:extLst>
+          </a:blip>
+          <a:srcRect l="25675" r="28633"/>
           <a:stretch/>
         </p:blipFill>
         <p:spPr>
           <a:xfrm>
-            <a:off x="164774" y="93290"/>
-            <a:ext cx="5541335" cy="3638762"/>
+            <a:off x="6526559" y="14269"/>
+            <a:ext cx="5072688" cy="6843731"/>
           </a:xfrm>
           <a:prstGeom prst="rect">
             <a:avLst/>
@@ -12473,10 +13198,10 @@
       </p:pic>
       <p:pic>
         <p:nvPicPr>
-          <p:cNvPr id="54" name="Imagen 53">
-            <a:extLst>
-              <a:ext uri="{FF2B5EF4-FFF2-40B4-BE49-F238E27FC236}">
-                <a16:creationId xmlns:a16="http://schemas.microsoft.com/office/drawing/2014/main" id="{B8582416-C696-4470-83CE-D87FDB6FC5DF}"/>
+          <p:cNvPr id="7" name="Imagen 6">
+            <a:extLst>
+              <a:ext uri="{FF2B5EF4-FFF2-40B4-BE49-F238E27FC236}">
+                <a16:creationId xmlns:a16="http://schemas.microsoft.com/office/drawing/2014/main" id="{1F59BC40-0591-4675-9CCB-D55648AE021F}"/>
               </a:ext>
             </a:extLst>
           </p:cNvPr>
@@ -12486,20 +13211,14 @@
           <p:nvPr/>
         </p:nvPicPr>
         <p:blipFill rotWithShape="1">
-          <a:blip r:embed="rId3">
-            <a:extLst>
-              <a:ext uri="{28A0092B-C50C-407E-A947-70E740481C1C}">
-                <a14:useLocalDpi xmlns:a14="http://schemas.microsoft.com/office/drawing/2010/main" val="0"/>
-              </a:ext>
-            </a:extLst>
-          </a:blip>
-          <a:srcRect l="25675" r="28633"/>
+          <a:blip r:embed="rId3"/>
+          <a:srcRect t="8982" b="8159"/>
           <a:stretch/>
         </p:blipFill>
         <p:spPr>
           <a:xfrm>
-            <a:off x="6526559" y="14269"/>
-            <a:ext cx="5072688" cy="6843731"/>
+            <a:off x="164774" y="93290"/>
+            <a:ext cx="5541335" cy="3638762"/>
           </a:xfrm>
           <a:prstGeom prst="rect">
             <a:avLst/>
@@ -12605,10 +13324,10 @@
       </p:pic>
       <p:pic>
         <p:nvPicPr>
-          <p:cNvPr id="24" name="Picture 2" descr="Hugging Face">
-            <a:extLst>
-              <a:ext uri="{FF2B5EF4-FFF2-40B4-BE49-F238E27FC236}">
-                <a16:creationId xmlns:a16="http://schemas.microsoft.com/office/drawing/2014/main" id="{6F9B8976-38C0-42C4-9840-EA9413DB5852}"/>
+          <p:cNvPr id="1032" name="Picture 8" descr="Proceso de Web Scraping">
+            <a:extLst>
+              <a:ext uri="{FF2B5EF4-FFF2-40B4-BE49-F238E27FC236}">
+                <a16:creationId xmlns:a16="http://schemas.microsoft.com/office/drawing/2014/main" id="{EE966221-7AE5-473E-A203-B8944C592861}"/>
               </a:ext>
             </a:extLst>
           </p:cNvPr>
@@ -12619,98 +13338,6 @@
         </p:nvPicPr>
         <p:blipFill rotWithShape="1">
           <a:blip r:embed="rId6">
-            <a:extLst>
-              <a:ext uri="{28A0092B-C50C-407E-A947-70E740481C1C}">
-                <a14:useLocalDpi xmlns:a14="http://schemas.microsoft.com/office/drawing/2010/main" val="0"/>
-              </a:ext>
-            </a:extLst>
-          </a:blip>
-          <a:srcRect l="28634" t="29013" r="28080" b="28993"/>
-          <a:stretch/>
-        </p:blipFill>
-        <p:spPr bwMode="auto">
-          <a:xfrm>
-            <a:off x="10255030" y="1988289"/>
-            <a:ext cx="1016952" cy="986633"/>
-          </a:xfrm>
-          <a:prstGeom prst="rect">
-            <a:avLst/>
-          </a:prstGeom>
-          <a:noFill/>
-          <a:extLst>
-            <a:ext uri="{909E8E84-426E-40DD-AFC4-6F175D3DCCD1}">
-              <a14:hiddenFill xmlns:a14="http://schemas.microsoft.com/office/drawing/2010/main">
-                <a:solidFill>
-                  <a:srgbClr val="FFFFFF"/>
-                </a:solidFill>
-              </a14:hiddenFill>
-            </a:ext>
-          </a:extLst>
-        </p:spPr>
-      </p:pic>
-      <p:pic>
-        <p:nvPicPr>
-          <p:cNvPr id="25" name="Picture 4" descr="Desbloquear el poder de la limpieza de datos eficaz: tÃ©cnicas, beneficios  y mejores prÃ¡cticas">
-            <a:extLst>
-              <a:ext uri="{FF2B5EF4-FFF2-40B4-BE49-F238E27FC236}">
-                <a16:creationId xmlns:a16="http://schemas.microsoft.com/office/drawing/2014/main" id="{8B307A9E-3BF0-45A4-B2CF-D803DFF20582}"/>
-              </a:ext>
-            </a:extLst>
-          </p:cNvPr>
-          <p:cNvPicPr>
-            <a:picLocks noChangeAspect="1" noChangeArrowheads="1"/>
-          </p:cNvPicPr>
-          <p:nvPr/>
-        </p:nvPicPr>
-        <p:blipFill>
-          <a:blip r:embed="rId7">
-            <a:extLst>
-              <a:ext uri="{28A0092B-C50C-407E-A947-70E740481C1C}">
-                <a14:useLocalDpi xmlns:a14="http://schemas.microsoft.com/office/drawing/2010/main" val="0"/>
-              </a:ext>
-            </a:extLst>
-          </a:blip>
-          <a:srcRect/>
-          <a:stretch>
-            <a:fillRect/>
-          </a:stretch>
-        </p:blipFill>
-        <p:spPr bwMode="auto">
-          <a:xfrm>
-            <a:off x="8754357" y="889836"/>
-            <a:ext cx="1009541" cy="1009541"/>
-          </a:xfrm>
-          <a:prstGeom prst="rect">
-            <a:avLst/>
-          </a:prstGeom>
-          <a:noFill/>
-          <a:extLst>
-            <a:ext uri="{909E8E84-426E-40DD-AFC4-6F175D3DCCD1}">
-              <a14:hiddenFill xmlns:a14="http://schemas.microsoft.com/office/drawing/2010/main">
-                <a:solidFill>
-                  <a:srgbClr val="FFFFFF"/>
-                </a:solidFill>
-              </a14:hiddenFill>
-            </a:ext>
-          </a:extLst>
-        </p:spPr>
-      </p:pic>
-      <p:pic>
-        <p:nvPicPr>
-          <p:cNvPr id="1032" name="Picture 8" descr="Proceso de Web Scraping">
-            <a:extLst>
-              <a:ext uri="{FF2B5EF4-FFF2-40B4-BE49-F238E27FC236}">
-                <a16:creationId xmlns:a16="http://schemas.microsoft.com/office/drawing/2014/main" id="{EE966221-7AE5-473E-A203-B8944C592861}"/>
-              </a:ext>
-            </a:extLst>
-          </p:cNvPr>
-          <p:cNvPicPr>
-            <a:picLocks noChangeAspect="1" noChangeArrowheads="1"/>
-          </p:cNvPicPr>
-          <p:nvPr/>
-        </p:nvPicPr>
-        <p:blipFill rotWithShape="1">
-          <a:blip r:embed="rId8">
             <a:extLst>
               <a:ext uri="{28A0092B-C50C-407E-A947-70E740481C1C}">
                 <a14:useLocalDpi xmlns:a14="http://schemas.microsoft.com/office/drawing/2010/main" val="0"/>
@@ -12755,7 +13382,7 @@
           <p:nvPr/>
         </p:nvPicPr>
         <p:blipFill rotWithShape="1">
-          <a:blip r:embed="rId9">
+          <a:blip r:embed="rId7">
             <a:extLst>
               <a:ext uri="{28A0092B-C50C-407E-A947-70E740481C1C}">
                 <a14:useLocalDpi xmlns:a14="http://schemas.microsoft.com/office/drawing/2010/main" val="0"/>
@@ -12787,650 +13414,6 @@
       </p:pic>
       <p:pic>
         <p:nvPicPr>
-          <p:cNvPr id="1036" name="Picture 12" descr="Keras: Deep Learning for humans">
-            <a:extLst>
-              <a:ext uri="{FF2B5EF4-FFF2-40B4-BE49-F238E27FC236}">
-                <a16:creationId xmlns:a16="http://schemas.microsoft.com/office/drawing/2014/main" id="{78608EC1-C13D-4742-A741-779E0067E9EF}"/>
-              </a:ext>
-            </a:extLst>
-          </p:cNvPr>
-          <p:cNvPicPr>
-            <a:picLocks noChangeAspect="1" noChangeArrowheads="1"/>
-          </p:cNvPicPr>
-          <p:nvPr/>
-        </p:nvPicPr>
-        <p:blipFill>
-          <a:blip r:embed="rId10">
-            <a:extLst>
-              <a:ext uri="{28A0092B-C50C-407E-A947-70E740481C1C}">
-                <a14:useLocalDpi xmlns:a14="http://schemas.microsoft.com/office/drawing/2010/main" val="0"/>
-              </a:ext>
-            </a:extLst>
-          </a:blip>
-          <a:srcRect/>
-          <a:stretch>
-            <a:fillRect/>
-          </a:stretch>
-        </p:blipFill>
-        <p:spPr bwMode="auto">
-          <a:xfrm>
-            <a:off x="10417795" y="4477393"/>
-            <a:ext cx="1206538" cy="349896"/>
-          </a:xfrm>
-          <a:prstGeom prst="rect">
-            <a:avLst/>
-          </a:prstGeom>
-          <a:noFill/>
-          <a:extLst>
-            <a:ext uri="{909E8E84-426E-40DD-AFC4-6F175D3DCCD1}">
-              <a14:hiddenFill xmlns:a14="http://schemas.microsoft.com/office/drawing/2010/main">
-                <a:solidFill>
-                  <a:srgbClr val="FFFFFF"/>
-                </a:solidFill>
-              </a14:hiddenFill>
-            </a:ext>
-          </a:extLst>
-        </p:spPr>
-      </p:pic>
-      <p:pic>
-        <p:nvPicPr>
-          <p:cNvPr id="1038" name="Picture 14" descr="Algoritmo - Iconos gratis de editar herramientas">
-            <a:extLst>
-              <a:ext uri="{FF2B5EF4-FFF2-40B4-BE49-F238E27FC236}">
-                <a16:creationId xmlns:a16="http://schemas.microsoft.com/office/drawing/2014/main" id="{BC62E01A-14AC-4F66-8BBD-6D93C5DF566F}"/>
-              </a:ext>
-            </a:extLst>
-          </p:cNvPr>
-          <p:cNvPicPr>
-            <a:picLocks noChangeAspect="1" noChangeArrowheads="1"/>
-          </p:cNvPicPr>
-          <p:nvPr/>
-        </p:nvPicPr>
-        <p:blipFill>
-          <a:blip r:embed="rId11">
-            <a:extLst>
-              <a:ext uri="{28A0092B-C50C-407E-A947-70E740481C1C}">
-                <a14:useLocalDpi xmlns:a14="http://schemas.microsoft.com/office/drawing/2010/main" val="0"/>
-              </a:ext>
-            </a:extLst>
-          </a:blip>
-          <a:srcRect/>
-          <a:stretch>
-            <a:fillRect/>
-          </a:stretch>
-        </p:blipFill>
-        <p:spPr bwMode="auto">
-          <a:xfrm>
-            <a:off x="6781800" y="3729888"/>
-            <a:ext cx="922453" cy="922453"/>
-          </a:xfrm>
-          <a:prstGeom prst="rect">
-            <a:avLst/>
-          </a:prstGeom>
-          <a:noFill/>
-          <a:extLst>
-            <a:ext uri="{909E8E84-426E-40DD-AFC4-6F175D3DCCD1}">
-              <a14:hiddenFill xmlns:a14="http://schemas.microsoft.com/office/drawing/2010/main">
-                <a:solidFill>
-                  <a:srgbClr val="FFFFFF"/>
-                </a:solidFill>
-              </a14:hiddenFill>
-            </a:ext>
-          </a:extLst>
-        </p:spPr>
-      </p:pic>
-      <p:pic>
-        <p:nvPicPr>
-          <p:cNvPr id="1040" name="Picture 16" descr="Comparison Generic Outline Color icon | Freepik">
-            <a:extLst>
-              <a:ext uri="{FF2B5EF4-FFF2-40B4-BE49-F238E27FC236}">
-                <a16:creationId xmlns:a16="http://schemas.microsoft.com/office/drawing/2014/main" id="{84CCE91B-F4D7-4F3A-AF31-3A245FC22E7A}"/>
-              </a:ext>
-            </a:extLst>
-          </p:cNvPr>
-          <p:cNvPicPr>
-            <a:picLocks noChangeAspect="1" noChangeArrowheads="1"/>
-          </p:cNvPicPr>
-          <p:nvPr/>
-        </p:nvPicPr>
-        <p:blipFill>
-          <a:blip r:embed="rId12">
-            <a:extLst>
-              <a:ext uri="{28A0092B-C50C-407E-A947-70E740481C1C}">
-                <a14:useLocalDpi xmlns:a14="http://schemas.microsoft.com/office/drawing/2010/main" val="0"/>
-              </a:ext>
-            </a:extLst>
-          </a:blip>
-          <a:srcRect/>
-          <a:stretch>
-            <a:fillRect/>
-          </a:stretch>
-        </p:blipFill>
-        <p:spPr bwMode="auto">
-          <a:xfrm>
-            <a:off x="10149486" y="5786568"/>
-            <a:ext cx="1003873" cy="1003873"/>
-          </a:xfrm>
-          <a:prstGeom prst="rect">
-            <a:avLst/>
-          </a:prstGeom>
-          <a:noFill/>
-          <a:extLst>
-            <a:ext uri="{909E8E84-426E-40DD-AFC4-6F175D3DCCD1}">
-              <a14:hiddenFill xmlns:a14="http://schemas.microsoft.com/office/drawing/2010/main">
-                <a:solidFill>
-                  <a:srgbClr val="FFFFFF"/>
-                </a:solidFill>
-              </a14:hiddenFill>
-            </a:ext>
-          </a:extLst>
-        </p:spPr>
-      </p:pic>
-      <p:pic>
-        <p:nvPicPr>
-          <p:cNvPr id="1042" name="Picture 18" descr="Datasets - DataForImpactProject">
-            <a:extLst>
-              <a:ext uri="{FF2B5EF4-FFF2-40B4-BE49-F238E27FC236}">
-                <a16:creationId xmlns:a16="http://schemas.microsoft.com/office/drawing/2014/main" id="{438E4823-BCBA-4AB9-82B1-82EECF985A52}"/>
-              </a:ext>
-            </a:extLst>
-          </p:cNvPr>
-          <p:cNvPicPr>
-            <a:picLocks noChangeAspect="1" noChangeArrowheads="1"/>
-          </p:cNvPicPr>
-          <p:nvPr/>
-        </p:nvPicPr>
-        <p:blipFill>
-          <a:blip r:embed="rId13">
-            <a:extLst>
-              <a:ext uri="{28A0092B-C50C-407E-A947-70E740481C1C}">
-                <a14:useLocalDpi xmlns:a14="http://schemas.microsoft.com/office/drawing/2010/main" val="0"/>
-              </a:ext>
-            </a:extLst>
-          </a:blip>
-          <a:srcRect/>
-          <a:stretch>
-            <a:fillRect/>
-          </a:stretch>
-        </p:blipFill>
-        <p:spPr bwMode="auto">
-          <a:xfrm>
-            <a:off x="10172983" y="103700"/>
-            <a:ext cx="1327261" cy="1331435"/>
-          </a:xfrm>
-          <a:prstGeom prst="rect">
-            <a:avLst/>
-          </a:prstGeom>
-          <a:noFill/>
-          <a:extLst>
-            <a:ext uri="{909E8E84-426E-40DD-AFC4-6F175D3DCCD1}">
-              <a14:hiddenFill xmlns:a14="http://schemas.microsoft.com/office/drawing/2010/main">
-                <a:solidFill>
-                  <a:srgbClr val="FFFFFF"/>
-                </a:solidFill>
-              </a14:hiddenFill>
-            </a:ext>
-          </a:extLst>
-        </p:spPr>
-      </p:pic>
-      <p:sp>
-        <p:nvSpPr>
-          <p:cNvPr id="63" name="Marcador de contenido 2">
-            <a:extLst>
-              <a:ext uri="{FF2B5EF4-FFF2-40B4-BE49-F238E27FC236}">
-                <a16:creationId xmlns:a16="http://schemas.microsoft.com/office/drawing/2014/main" id="{3D19C736-A91B-4877-9BCB-3FE8A271C72D}"/>
-              </a:ext>
-            </a:extLst>
-          </p:cNvPr>
-          <p:cNvSpPr>
-            <a:spLocks noGrp="1"/>
-          </p:cNvSpPr>
-          <p:nvPr>
-            <p:ph idx="1"/>
-          </p:nvPr>
-        </p:nvSpPr>
-        <p:spPr>
-          <a:xfrm>
-            <a:off x="10288243" y="99867"/>
-            <a:ext cx="677015" cy="349398"/>
-          </a:xfrm>
-        </p:spPr>
-        <p:txBody>
-          <a:bodyPr>
-            <a:normAutofit/>
-          </a:bodyPr>
-          <a:lstStyle/>
-          <a:p>
-            <a:pPr marL="0" indent="0">
-              <a:buNone/>
-            </a:pPr>
-            <a:r>
-              <a:rPr lang="es-MX" sz="1800" dirty="0">
-                <a:solidFill>
-                  <a:srgbClr val="A7BF39"/>
-                </a:solidFill>
-              </a:rPr>
-              <a:t>70%</a:t>
-            </a:r>
-          </a:p>
-        </p:txBody>
-      </p:sp>
-      <p:sp>
-        <p:nvSpPr>
-          <p:cNvPr id="64" name="Marcador de contenido 2">
-            <a:extLst>
-              <a:ext uri="{FF2B5EF4-FFF2-40B4-BE49-F238E27FC236}">
-                <a16:creationId xmlns:a16="http://schemas.microsoft.com/office/drawing/2014/main" id="{98D01804-CC01-4EE1-AB35-654DF33E1FA5}"/>
-              </a:ext>
-            </a:extLst>
-          </p:cNvPr>
-          <p:cNvSpPr txBox="1">
-            <a:spLocks/>
-          </p:cNvSpPr>
-          <p:nvPr/>
-        </p:nvSpPr>
-        <p:spPr>
-          <a:xfrm>
-            <a:off x="11056353" y="355949"/>
-            <a:ext cx="481433" cy="349398"/>
-          </a:xfrm>
-          <a:prstGeom prst="rect">
-            <a:avLst/>
-          </a:prstGeom>
-        </p:spPr>
-        <p:txBody>
-          <a:bodyPr vert="horz" lIns="91440" tIns="45720" rIns="91440" bIns="45720" rtlCol="0">
-            <a:normAutofit/>
-          </a:bodyPr>
-          <a:lstStyle>
-            <a:lvl1pPr marL="228600" indent="-228600" algn="l" defTabSz="914400" rtl="0" eaLnBrk="1" latinLnBrk="0" hangingPunct="1">
-              <a:lnSpc>
-                <a:spcPct val="90000"/>
-              </a:lnSpc>
-              <a:spcBef>
-                <a:spcPts val="1000"/>
-              </a:spcBef>
-              <a:buFont typeface="Arial" panose="020B0604020202020204" pitchFamily="34" charset="0"/>
-              <a:buChar char="•"/>
-              <a:defRPr sz="2800" kern="1200">
-                <a:solidFill>
-                  <a:schemeClr val="tx1"/>
-                </a:solidFill>
-                <a:latin typeface="+mn-lt"/>
-                <a:ea typeface="+mn-ea"/>
-                <a:cs typeface="+mn-cs"/>
-              </a:defRPr>
-            </a:lvl1pPr>
-            <a:lvl2pPr marL="685800" indent="-228600" algn="l" defTabSz="914400" rtl="0" eaLnBrk="1" latinLnBrk="0" hangingPunct="1">
-              <a:lnSpc>
-                <a:spcPct val="90000"/>
-              </a:lnSpc>
-              <a:spcBef>
-                <a:spcPts val="500"/>
-              </a:spcBef>
-              <a:buFont typeface="Arial" panose="020B0604020202020204" pitchFamily="34" charset="0"/>
-              <a:buChar char="•"/>
-              <a:defRPr sz="2400" kern="1200">
-                <a:solidFill>
-                  <a:schemeClr val="tx1"/>
-                </a:solidFill>
-                <a:latin typeface="+mn-lt"/>
-                <a:ea typeface="+mn-ea"/>
-                <a:cs typeface="+mn-cs"/>
-              </a:defRPr>
-            </a:lvl2pPr>
-            <a:lvl3pPr marL="1143000" indent="-228600" algn="l" defTabSz="914400" rtl="0" eaLnBrk="1" latinLnBrk="0" hangingPunct="1">
-              <a:lnSpc>
-                <a:spcPct val="90000"/>
-              </a:lnSpc>
-              <a:spcBef>
-                <a:spcPts val="500"/>
-              </a:spcBef>
-              <a:buFont typeface="Arial" panose="020B0604020202020204" pitchFamily="34" charset="0"/>
-              <a:buChar char="•"/>
-              <a:defRPr sz="2000" kern="1200">
-                <a:solidFill>
-                  <a:schemeClr val="tx1"/>
-                </a:solidFill>
-                <a:latin typeface="+mn-lt"/>
-                <a:ea typeface="+mn-ea"/>
-                <a:cs typeface="+mn-cs"/>
-              </a:defRPr>
-            </a:lvl3pPr>
-            <a:lvl4pPr marL="1600200" indent="-228600" algn="l" defTabSz="914400" rtl="0" eaLnBrk="1" latinLnBrk="0" hangingPunct="1">
-              <a:lnSpc>
-                <a:spcPct val="90000"/>
-              </a:lnSpc>
-              <a:spcBef>
-                <a:spcPts val="500"/>
-              </a:spcBef>
-              <a:buFont typeface="Arial" panose="020B0604020202020204" pitchFamily="34" charset="0"/>
-              <a:buChar char="•"/>
-              <a:defRPr sz="1800" kern="1200">
-                <a:solidFill>
-                  <a:schemeClr val="tx1"/>
-                </a:solidFill>
-                <a:latin typeface="+mn-lt"/>
-                <a:ea typeface="+mn-ea"/>
-                <a:cs typeface="+mn-cs"/>
-              </a:defRPr>
-            </a:lvl4pPr>
-            <a:lvl5pPr marL="2057400" indent="-228600" algn="l" defTabSz="914400" rtl="0" eaLnBrk="1" latinLnBrk="0" hangingPunct="1">
-              <a:lnSpc>
-                <a:spcPct val="90000"/>
-              </a:lnSpc>
-              <a:spcBef>
-                <a:spcPts val="500"/>
-              </a:spcBef>
-              <a:buFont typeface="Arial" panose="020B0604020202020204" pitchFamily="34" charset="0"/>
-              <a:buChar char="•"/>
-              <a:defRPr sz="1800" kern="1200">
-                <a:solidFill>
-                  <a:schemeClr val="tx1"/>
-                </a:solidFill>
-                <a:latin typeface="+mn-lt"/>
-                <a:ea typeface="+mn-ea"/>
-                <a:cs typeface="+mn-cs"/>
-              </a:defRPr>
-            </a:lvl5pPr>
-            <a:lvl6pPr marL="2514600" indent="-228600" algn="l" defTabSz="914400" rtl="0" eaLnBrk="1" latinLnBrk="0" hangingPunct="1">
-              <a:lnSpc>
-                <a:spcPct val="90000"/>
-              </a:lnSpc>
-              <a:spcBef>
-                <a:spcPts val="500"/>
-              </a:spcBef>
-              <a:buFont typeface="Arial" panose="020B0604020202020204" pitchFamily="34" charset="0"/>
-              <a:buChar char="•"/>
-              <a:defRPr sz="1800" kern="1200">
-                <a:solidFill>
-                  <a:schemeClr val="tx1"/>
-                </a:solidFill>
-                <a:latin typeface="+mn-lt"/>
-                <a:ea typeface="+mn-ea"/>
-                <a:cs typeface="+mn-cs"/>
-              </a:defRPr>
-            </a:lvl6pPr>
-            <a:lvl7pPr marL="2971800" indent="-228600" algn="l" defTabSz="914400" rtl="0" eaLnBrk="1" latinLnBrk="0" hangingPunct="1">
-              <a:lnSpc>
-                <a:spcPct val="90000"/>
-              </a:lnSpc>
-              <a:spcBef>
-                <a:spcPts val="500"/>
-              </a:spcBef>
-              <a:buFont typeface="Arial" panose="020B0604020202020204" pitchFamily="34" charset="0"/>
-              <a:buChar char="•"/>
-              <a:defRPr sz="1800" kern="1200">
-                <a:solidFill>
-                  <a:schemeClr val="tx1"/>
-                </a:solidFill>
-                <a:latin typeface="+mn-lt"/>
-                <a:ea typeface="+mn-ea"/>
-                <a:cs typeface="+mn-cs"/>
-              </a:defRPr>
-            </a:lvl7pPr>
-            <a:lvl8pPr marL="3429000" indent="-228600" algn="l" defTabSz="914400" rtl="0" eaLnBrk="1" latinLnBrk="0" hangingPunct="1">
-              <a:lnSpc>
-                <a:spcPct val="90000"/>
-              </a:lnSpc>
-              <a:spcBef>
-                <a:spcPts val="500"/>
-              </a:spcBef>
-              <a:buFont typeface="Arial" panose="020B0604020202020204" pitchFamily="34" charset="0"/>
-              <a:buChar char="•"/>
-              <a:defRPr sz="1800" kern="1200">
-                <a:solidFill>
-                  <a:schemeClr val="tx1"/>
-                </a:solidFill>
-                <a:latin typeface="+mn-lt"/>
-                <a:ea typeface="+mn-ea"/>
-                <a:cs typeface="+mn-cs"/>
-              </a:defRPr>
-            </a:lvl8pPr>
-            <a:lvl9pPr marL="3886200" indent="-228600" algn="l" defTabSz="914400" rtl="0" eaLnBrk="1" latinLnBrk="0" hangingPunct="1">
-              <a:lnSpc>
-                <a:spcPct val="90000"/>
-              </a:lnSpc>
-              <a:spcBef>
-                <a:spcPts val="500"/>
-              </a:spcBef>
-              <a:buFont typeface="Arial" panose="020B0604020202020204" pitchFamily="34" charset="0"/>
-              <a:buChar char="•"/>
-              <a:defRPr sz="1800" kern="1200">
-                <a:solidFill>
-                  <a:schemeClr val="tx1"/>
-                </a:solidFill>
-                <a:latin typeface="+mn-lt"/>
-                <a:ea typeface="+mn-ea"/>
-                <a:cs typeface="+mn-cs"/>
-              </a:defRPr>
-            </a:lvl9pPr>
-          </a:lstStyle>
-          <a:p>
-            <a:pPr marL="0" indent="0">
-              <a:buFont typeface="Arial" panose="020B0604020202020204" pitchFamily="34" charset="0"/>
-              <a:buNone/>
-            </a:pPr>
-            <a:r>
-              <a:rPr lang="es-MX" sz="1200" dirty="0">
-                <a:solidFill>
-                  <a:srgbClr val="D44102"/>
-                </a:solidFill>
-              </a:rPr>
-              <a:t>10%</a:t>
-            </a:r>
-          </a:p>
-        </p:txBody>
-      </p:sp>
-      <p:sp>
-        <p:nvSpPr>
-          <p:cNvPr id="65" name="Marcador de contenido 2">
-            <a:extLst>
-              <a:ext uri="{FF2B5EF4-FFF2-40B4-BE49-F238E27FC236}">
-                <a16:creationId xmlns:a16="http://schemas.microsoft.com/office/drawing/2014/main" id="{4040B223-B084-42FB-9894-4D0159DBCFF8}"/>
-              </a:ext>
-            </a:extLst>
-          </p:cNvPr>
-          <p:cNvSpPr txBox="1">
-            <a:spLocks/>
-          </p:cNvSpPr>
-          <p:nvPr/>
-        </p:nvSpPr>
-        <p:spPr>
-          <a:xfrm>
-            <a:off x="10683561" y="567490"/>
-            <a:ext cx="588422" cy="393486"/>
-          </a:xfrm>
-          <a:prstGeom prst="rect">
-            <a:avLst/>
-          </a:prstGeom>
-        </p:spPr>
-        <p:txBody>
-          <a:bodyPr vert="horz" lIns="91440" tIns="45720" rIns="91440" bIns="45720" rtlCol="0">
-            <a:normAutofit/>
-          </a:bodyPr>
-          <a:lstStyle>
-            <a:lvl1pPr marL="228600" indent="-228600" algn="l" defTabSz="914400" rtl="0" eaLnBrk="1" latinLnBrk="0" hangingPunct="1">
-              <a:lnSpc>
-                <a:spcPct val="90000"/>
-              </a:lnSpc>
-              <a:spcBef>
-                <a:spcPts val="1000"/>
-              </a:spcBef>
-              <a:buFont typeface="Arial" panose="020B0604020202020204" pitchFamily="34" charset="0"/>
-              <a:buChar char="•"/>
-              <a:defRPr sz="2800" kern="1200">
-                <a:solidFill>
-                  <a:schemeClr val="tx1"/>
-                </a:solidFill>
-                <a:latin typeface="+mn-lt"/>
-                <a:ea typeface="+mn-ea"/>
-                <a:cs typeface="+mn-cs"/>
-              </a:defRPr>
-            </a:lvl1pPr>
-            <a:lvl2pPr marL="685800" indent="-228600" algn="l" defTabSz="914400" rtl="0" eaLnBrk="1" latinLnBrk="0" hangingPunct="1">
-              <a:lnSpc>
-                <a:spcPct val="90000"/>
-              </a:lnSpc>
-              <a:spcBef>
-                <a:spcPts val="500"/>
-              </a:spcBef>
-              <a:buFont typeface="Arial" panose="020B0604020202020204" pitchFamily="34" charset="0"/>
-              <a:buChar char="•"/>
-              <a:defRPr sz="2400" kern="1200">
-                <a:solidFill>
-                  <a:schemeClr val="tx1"/>
-                </a:solidFill>
-                <a:latin typeface="+mn-lt"/>
-                <a:ea typeface="+mn-ea"/>
-                <a:cs typeface="+mn-cs"/>
-              </a:defRPr>
-            </a:lvl2pPr>
-            <a:lvl3pPr marL="1143000" indent="-228600" algn="l" defTabSz="914400" rtl="0" eaLnBrk="1" latinLnBrk="0" hangingPunct="1">
-              <a:lnSpc>
-                <a:spcPct val="90000"/>
-              </a:lnSpc>
-              <a:spcBef>
-                <a:spcPts val="500"/>
-              </a:spcBef>
-              <a:buFont typeface="Arial" panose="020B0604020202020204" pitchFamily="34" charset="0"/>
-              <a:buChar char="•"/>
-              <a:defRPr sz="2000" kern="1200">
-                <a:solidFill>
-                  <a:schemeClr val="tx1"/>
-                </a:solidFill>
-                <a:latin typeface="+mn-lt"/>
-                <a:ea typeface="+mn-ea"/>
-                <a:cs typeface="+mn-cs"/>
-              </a:defRPr>
-            </a:lvl3pPr>
-            <a:lvl4pPr marL="1600200" indent="-228600" algn="l" defTabSz="914400" rtl="0" eaLnBrk="1" latinLnBrk="0" hangingPunct="1">
-              <a:lnSpc>
-                <a:spcPct val="90000"/>
-              </a:lnSpc>
-              <a:spcBef>
-                <a:spcPts val="500"/>
-              </a:spcBef>
-              <a:buFont typeface="Arial" panose="020B0604020202020204" pitchFamily="34" charset="0"/>
-              <a:buChar char="•"/>
-              <a:defRPr sz="1800" kern="1200">
-                <a:solidFill>
-                  <a:schemeClr val="tx1"/>
-                </a:solidFill>
-                <a:latin typeface="+mn-lt"/>
-                <a:ea typeface="+mn-ea"/>
-                <a:cs typeface="+mn-cs"/>
-              </a:defRPr>
-            </a:lvl4pPr>
-            <a:lvl5pPr marL="2057400" indent="-228600" algn="l" defTabSz="914400" rtl="0" eaLnBrk="1" latinLnBrk="0" hangingPunct="1">
-              <a:lnSpc>
-                <a:spcPct val="90000"/>
-              </a:lnSpc>
-              <a:spcBef>
-                <a:spcPts val="500"/>
-              </a:spcBef>
-              <a:buFont typeface="Arial" panose="020B0604020202020204" pitchFamily="34" charset="0"/>
-              <a:buChar char="•"/>
-              <a:defRPr sz="1800" kern="1200">
-                <a:solidFill>
-                  <a:schemeClr val="tx1"/>
-                </a:solidFill>
-                <a:latin typeface="+mn-lt"/>
-                <a:ea typeface="+mn-ea"/>
-                <a:cs typeface="+mn-cs"/>
-              </a:defRPr>
-            </a:lvl5pPr>
-            <a:lvl6pPr marL="2514600" indent="-228600" algn="l" defTabSz="914400" rtl="0" eaLnBrk="1" latinLnBrk="0" hangingPunct="1">
-              <a:lnSpc>
-                <a:spcPct val="90000"/>
-              </a:lnSpc>
-              <a:spcBef>
-                <a:spcPts val="500"/>
-              </a:spcBef>
-              <a:buFont typeface="Arial" panose="020B0604020202020204" pitchFamily="34" charset="0"/>
-              <a:buChar char="•"/>
-              <a:defRPr sz="1800" kern="1200">
-                <a:solidFill>
-                  <a:schemeClr val="tx1"/>
-                </a:solidFill>
-                <a:latin typeface="+mn-lt"/>
-                <a:ea typeface="+mn-ea"/>
-                <a:cs typeface="+mn-cs"/>
-              </a:defRPr>
-            </a:lvl6pPr>
-            <a:lvl7pPr marL="2971800" indent="-228600" algn="l" defTabSz="914400" rtl="0" eaLnBrk="1" latinLnBrk="0" hangingPunct="1">
-              <a:lnSpc>
-                <a:spcPct val="90000"/>
-              </a:lnSpc>
-              <a:spcBef>
-                <a:spcPts val="500"/>
-              </a:spcBef>
-              <a:buFont typeface="Arial" panose="020B0604020202020204" pitchFamily="34" charset="0"/>
-              <a:buChar char="•"/>
-              <a:defRPr sz="1800" kern="1200">
-                <a:solidFill>
-                  <a:schemeClr val="tx1"/>
-                </a:solidFill>
-                <a:latin typeface="+mn-lt"/>
-                <a:ea typeface="+mn-ea"/>
-                <a:cs typeface="+mn-cs"/>
-              </a:defRPr>
-            </a:lvl7pPr>
-            <a:lvl8pPr marL="3429000" indent="-228600" algn="l" defTabSz="914400" rtl="0" eaLnBrk="1" latinLnBrk="0" hangingPunct="1">
-              <a:lnSpc>
-                <a:spcPct val="90000"/>
-              </a:lnSpc>
-              <a:spcBef>
-                <a:spcPts val="500"/>
-              </a:spcBef>
-              <a:buFont typeface="Arial" panose="020B0604020202020204" pitchFamily="34" charset="0"/>
-              <a:buChar char="•"/>
-              <a:defRPr sz="1800" kern="1200">
-                <a:solidFill>
-                  <a:schemeClr val="tx1"/>
-                </a:solidFill>
-                <a:latin typeface="+mn-lt"/>
-                <a:ea typeface="+mn-ea"/>
-                <a:cs typeface="+mn-cs"/>
-              </a:defRPr>
-            </a:lvl8pPr>
-            <a:lvl9pPr marL="3886200" indent="-228600" algn="l" defTabSz="914400" rtl="0" eaLnBrk="1" latinLnBrk="0" hangingPunct="1">
-              <a:lnSpc>
-                <a:spcPct val="90000"/>
-              </a:lnSpc>
-              <a:spcBef>
-                <a:spcPts val="500"/>
-              </a:spcBef>
-              <a:buFont typeface="Arial" panose="020B0604020202020204" pitchFamily="34" charset="0"/>
-              <a:buChar char="•"/>
-              <a:defRPr sz="1800" kern="1200">
-                <a:solidFill>
-                  <a:schemeClr val="tx1"/>
-                </a:solidFill>
-                <a:latin typeface="+mn-lt"/>
-                <a:ea typeface="+mn-ea"/>
-                <a:cs typeface="+mn-cs"/>
-              </a:defRPr>
-            </a:lvl9pPr>
-          </a:lstStyle>
-          <a:p>
-            <a:pPr marL="0" indent="0">
-              <a:buFont typeface="Arial" panose="020B0604020202020204" pitchFamily="34" charset="0"/>
-              <a:buNone/>
-            </a:pPr>
-            <a:r>
-              <a:rPr lang="es-MX" sz="1700" dirty="0">
-                <a:solidFill>
-                  <a:srgbClr val="264E59"/>
-                </a:solidFill>
-              </a:rPr>
-              <a:t>20%</a:t>
-            </a:r>
-          </a:p>
-        </p:txBody>
-      </p:sp>
-      <p:pic>
-        <p:nvPicPr>
           <p:cNvPr id="57" name="Imagen 56">
             <a:extLst>
               <a:ext uri="{FF2B5EF4-FFF2-40B4-BE49-F238E27FC236}">
@@ -13444,7 +13427,7 @@
           <p:nvPr/>
         </p:nvPicPr>
         <p:blipFill rotWithShape="1">
-          <a:blip r:embed="rId14">
+          <a:blip r:embed="rId8">
             <a:extLst>
               <a:ext uri="{28A0092B-C50C-407E-A947-70E740481C1C}">
                 <a14:useLocalDpi xmlns:a14="http://schemas.microsoft.com/office/drawing/2010/main" val="0"/>
@@ -13526,7 +13509,7 @@
           <p:nvPr/>
         </p:nvPicPr>
         <p:blipFill rotWithShape="1">
-          <a:blip r:embed="rId15">
+          <a:blip r:embed="rId9">
             <a:extLst>
               <a:ext uri="{28A0092B-C50C-407E-A947-70E740481C1C}">
                 <a14:useLocalDpi xmlns:a14="http://schemas.microsoft.com/office/drawing/2010/main" val="0"/>
@@ -13546,48 +13529,6 @@
           </a:prstGeom>
         </p:spPr>
       </p:pic>
-      <p:cxnSp>
-        <p:nvCxnSpPr>
-          <p:cNvPr id="73" name="Conector: angular 72">
-            <a:extLst>
-              <a:ext uri="{FF2B5EF4-FFF2-40B4-BE49-F238E27FC236}">
-                <a16:creationId xmlns:a16="http://schemas.microsoft.com/office/drawing/2014/main" id="{6FE8A4D0-24F9-40DC-A108-33A865806CE0}"/>
-              </a:ext>
-            </a:extLst>
-          </p:cNvPr>
-          <p:cNvCxnSpPr>
-            <a:cxnSpLocks/>
-            <a:stCxn id="62" idx="1"/>
-          </p:cNvCxnSpPr>
-          <p:nvPr/>
-        </p:nvCxnSpPr>
-        <p:spPr>
-          <a:xfrm rot="10800000">
-            <a:off x="3762375" y="6353175"/>
-            <a:ext cx="2798672" cy="113266"/>
-          </a:xfrm>
-          <a:prstGeom prst="bentConnector3">
-            <a:avLst/>
-          </a:prstGeom>
-          <a:ln>
-            <a:tailEnd type="triangle"/>
-          </a:ln>
-        </p:spPr>
-        <p:style>
-          <a:lnRef idx="1">
-            <a:schemeClr val="accent1"/>
-          </a:lnRef>
-          <a:fillRef idx="0">
-            <a:schemeClr val="accent1"/>
-          </a:fillRef>
-          <a:effectRef idx="0">
-            <a:schemeClr val="accent1"/>
-          </a:effectRef>
-          <a:fontRef idx="minor">
-            <a:schemeClr val="tx1"/>
-          </a:fontRef>
-        </p:style>
-      </p:cxnSp>
       <p:pic>
         <p:nvPicPr>
           <p:cNvPr id="1044" name="Picture 20" descr="Flask - Wikipedia, la enciclopedia libre">
@@ -13603,7 +13544,7 @@
           <p:nvPr/>
         </p:nvPicPr>
         <p:blipFill>
-          <a:blip r:embed="rId16">
+          <a:blip r:embed="rId10">
             <a:extLst>
               <a:ext uri="{28A0092B-C50C-407E-A947-70E740481C1C}">
                 <a14:useLocalDpi xmlns:a14="http://schemas.microsoft.com/office/drawing/2010/main" val="0"/>
@@ -13650,7 +13591,7 @@
           <p:nvPr/>
         </p:nvPicPr>
         <p:blipFill>
-          <a:blip r:embed="rId17">
+          <a:blip r:embed="rId11">
             <a:extLst>
               <a:ext uri="{28A0092B-C50C-407E-A947-70E740481C1C}">
                 <a14:useLocalDpi xmlns:a14="http://schemas.microsoft.com/office/drawing/2010/main" val="0"/>
@@ -13697,7 +13638,7 @@
           <p:nvPr/>
         </p:nvPicPr>
         <p:blipFill rotWithShape="1">
-          <a:blip r:embed="rId18">
+          <a:blip r:embed="rId12">
             <a:extLst>
               <a:ext uri="{28A0092B-C50C-407E-A947-70E740481C1C}">
                 <a14:useLocalDpi xmlns:a14="http://schemas.microsoft.com/office/drawing/2010/main" val="0"/>
@@ -13742,7 +13683,7 @@
           <p:nvPr/>
         </p:nvPicPr>
         <p:blipFill rotWithShape="1">
-          <a:blip r:embed="rId19">
+          <a:blip r:embed="rId13">
             <a:extLst>
               <a:ext uri="{28A0092B-C50C-407E-A947-70E740481C1C}">
                 <a14:useLocalDpi xmlns:a14="http://schemas.microsoft.com/office/drawing/2010/main" val="0"/>
@@ -13787,7 +13728,7 @@
           <p:nvPr/>
         </p:nvPicPr>
         <p:blipFill rotWithShape="1">
-          <a:blip r:embed="rId19">
+          <a:blip r:embed="rId13">
             <a:extLst>
               <a:ext uri="{28A0092B-C50C-407E-A947-70E740481C1C}">
                 <a14:useLocalDpi xmlns:a14="http://schemas.microsoft.com/office/drawing/2010/main" val="0"/>
@@ -13832,7 +13773,7 @@
           <p:nvPr/>
         </p:nvPicPr>
         <p:blipFill rotWithShape="1">
-          <a:blip r:embed="rId19">
+          <a:blip r:embed="rId13">
             <a:extLst>
               <a:ext uri="{28A0092B-C50C-407E-A947-70E740481C1C}">
                 <a14:useLocalDpi xmlns:a14="http://schemas.microsoft.com/office/drawing/2010/main" val="0"/>
@@ -13877,7 +13818,7 @@
           <p:nvPr/>
         </p:nvPicPr>
         <p:blipFill>
-          <a:blip r:embed="rId20">
+          <a:blip r:embed="rId14">
             <a:extLst>
               <a:ext uri="{28A0092B-C50C-407E-A947-70E740481C1C}">
                 <a14:useLocalDpi xmlns:a14="http://schemas.microsoft.com/office/drawing/2010/main" val="0"/>
@@ -14118,6 +14059,683 @@
                 <a:srgbClr val="7030A0"/>
               </a:solidFill>
             </a:endParaRPr>
+          </a:p>
+        </p:txBody>
+      </p:sp>
+      <p:graphicFrame>
+        <p:nvGraphicFramePr>
+          <p:cNvPr id="30" name="Gráfico 29">
+            <a:extLst>
+              <a:ext uri="{FF2B5EF4-FFF2-40B4-BE49-F238E27FC236}">
+                <a16:creationId xmlns:a16="http://schemas.microsoft.com/office/drawing/2014/main" id="{E4823035-8E3B-4CB7-B063-8C833ED8D054}"/>
+              </a:ext>
+            </a:extLst>
+          </p:cNvPr>
+          <p:cNvGraphicFramePr>
+            <a:graphicFrameLocks/>
+          </p:cNvGraphicFramePr>
+          <p:nvPr>
+            <p:extLst>
+              <p:ext uri="{D42A27DB-BD31-4B8C-83A1-F6EECF244321}">
+                <p14:modId xmlns:p14="http://schemas.microsoft.com/office/powerpoint/2010/main" val="2551276981"/>
+              </p:ext>
+            </p:extLst>
+          </p:nvPr>
+        </p:nvGraphicFramePr>
+        <p:xfrm>
+          <a:off x="9968126" y="202658"/>
+          <a:ext cx="1236475" cy="1160569"/>
+        </p:xfrm>
+        <a:graphic>
+          <a:graphicData uri="http://schemas.openxmlformats.org/drawingml/2006/chart">
+            <c:chart xmlns:c="http://schemas.openxmlformats.org/drawingml/2006/chart" xmlns:r="http://schemas.openxmlformats.org/officeDocument/2006/relationships" r:id="rId15"/>
+          </a:graphicData>
+        </a:graphic>
+      </p:graphicFrame>
+      <p:sp>
+        <p:nvSpPr>
+          <p:cNvPr id="63" name="Marcador de contenido 2">
+            <a:extLst>
+              <a:ext uri="{FF2B5EF4-FFF2-40B4-BE49-F238E27FC236}">
+                <a16:creationId xmlns:a16="http://schemas.microsoft.com/office/drawing/2014/main" id="{3D19C736-A91B-4877-9BCB-3FE8A271C72D}"/>
+              </a:ext>
+            </a:extLst>
+          </p:cNvPr>
+          <p:cNvSpPr>
+            <a:spLocks noGrp="1"/>
+          </p:cNvSpPr>
+          <p:nvPr>
+            <p:ph idx="1"/>
+          </p:nvPr>
+        </p:nvSpPr>
+        <p:spPr>
+          <a:xfrm>
+            <a:off x="11076791" y="615749"/>
+            <a:ext cx="419577" cy="349398"/>
+          </a:xfrm>
+        </p:spPr>
+        <p:txBody>
+          <a:bodyPr>
+            <a:normAutofit/>
+          </a:bodyPr>
+          <a:lstStyle/>
+          <a:p>
+            <a:pPr marL="0" indent="0">
+              <a:buNone/>
+            </a:pPr>
+            <a:r>
+              <a:rPr lang="es-MX" sz="1800" dirty="0"/>
+              <a:t>70</a:t>
+            </a:r>
+          </a:p>
+        </p:txBody>
+      </p:sp>
+      <p:sp>
+        <p:nvSpPr>
+          <p:cNvPr id="65" name="Marcador de contenido 2">
+            <a:extLst>
+              <a:ext uri="{FF2B5EF4-FFF2-40B4-BE49-F238E27FC236}">
+                <a16:creationId xmlns:a16="http://schemas.microsoft.com/office/drawing/2014/main" id="{4040B223-B084-42FB-9894-4D0159DBCFF8}"/>
+              </a:ext>
+            </a:extLst>
+          </p:cNvPr>
+          <p:cNvSpPr txBox="1">
+            <a:spLocks/>
+          </p:cNvSpPr>
+          <p:nvPr/>
+        </p:nvSpPr>
+        <p:spPr>
+          <a:xfrm>
+            <a:off x="9997942" y="396962"/>
+            <a:ext cx="588422" cy="393486"/>
+          </a:xfrm>
+          <a:prstGeom prst="rect">
+            <a:avLst/>
+          </a:prstGeom>
+        </p:spPr>
+        <p:txBody>
+          <a:bodyPr vert="horz" lIns="91440" tIns="45720" rIns="91440" bIns="45720" rtlCol="0">
+            <a:normAutofit/>
+          </a:bodyPr>
+          <a:lstStyle>
+            <a:lvl1pPr marL="228600" indent="-228600" algn="l" defTabSz="914400" rtl="0" eaLnBrk="1" latinLnBrk="0" hangingPunct="1">
+              <a:lnSpc>
+                <a:spcPct val="90000"/>
+              </a:lnSpc>
+              <a:spcBef>
+                <a:spcPts val="1000"/>
+              </a:spcBef>
+              <a:buFont typeface="Arial" panose="020B0604020202020204" pitchFamily="34" charset="0"/>
+              <a:buChar char="•"/>
+              <a:defRPr sz="2800" kern="1200">
+                <a:solidFill>
+                  <a:schemeClr val="tx1"/>
+                </a:solidFill>
+                <a:latin typeface="+mn-lt"/>
+                <a:ea typeface="+mn-ea"/>
+                <a:cs typeface="+mn-cs"/>
+              </a:defRPr>
+            </a:lvl1pPr>
+            <a:lvl2pPr marL="685800" indent="-228600" algn="l" defTabSz="914400" rtl="0" eaLnBrk="1" latinLnBrk="0" hangingPunct="1">
+              <a:lnSpc>
+                <a:spcPct val="90000"/>
+              </a:lnSpc>
+              <a:spcBef>
+                <a:spcPts val="500"/>
+              </a:spcBef>
+              <a:buFont typeface="Arial" panose="020B0604020202020204" pitchFamily="34" charset="0"/>
+              <a:buChar char="•"/>
+              <a:defRPr sz="2400" kern="1200">
+                <a:solidFill>
+                  <a:schemeClr val="tx1"/>
+                </a:solidFill>
+                <a:latin typeface="+mn-lt"/>
+                <a:ea typeface="+mn-ea"/>
+                <a:cs typeface="+mn-cs"/>
+              </a:defRPr>
+            </a:lvl2pPr>
+            <a:lvl3pPr marL="1143000" indent="-228600" algn="l" defTabSz="914400" rtl="0" eaLnBrk="1" latinLnBrk="0" hangingPunct="1">
+              <a:lnSpc>
+                <a:spcPct val="90000"/>
+              </a:lnSpc>
+              <a:spcBef>
+                <a:spcPts val="500"/>
+              </a:spcBef>
+              <a:buFont typeface="Arial" panose="020B0604020202020204" pitchFamily="34" charset="0"/>
+              <a:buChar char="•"/>
+              <a:defRPr sz="2000" kern="1200">
+                <a:solidFill>
+                  <a:schemeClr val="tx1"/>
+                </a:solidFill>
+                <a:latin typeface="+mn-lt"/>
+                <a:ea typeface="+mn-ea"/>
+                <a:cs typeface="+mn-cs"/>
+              </a:defRPr>
+            </a:lvl3pPr>
+            <a:lvl4pPr marL="1600200" indent="-228600" algn="l" defTabSz="914400" rtl="0" eaLnBrk="1" latinLnBrk="0" hangingPunct="1">
+              <a:lnSpc>
+                <a:spcPct val="90000"/>
+              </a:lnSpc>
+              <a:spcBef>
+                <a:spcPts val="500"/>
+              </a:spcBef>
+              <a:buFont typeface="Arial" panose="020B0604020202020204" pitchFamily="34" charset="0"/>
+              <a:buChar char="•"/>
+              <a:defRPr sz="1800" kern="1200">
+                <a:solidFill>
+                  <a:schemeClr val="tx1"/>
+                </a:solidFill>
+                <a:latin typeface="+mn-lt"/>
+                <a:ea typeface="+mn-ea"/>
+                <a:cs typeface="+mn-cs"/>
+              </a:defRPr>
+            </a:lvl4pPr>
+            <a:lvl5pPr marL="2057400" indent="-228600" algn="l" defTabSz="914400" rtl="0" eaLnBrk="1" latinLnBrk="0" hangingPunct="1">
+              <a:lnSpc>
+                <a:spcPct val="90000"/>
+              </a:lnSpc>
+              <a:spcBef>
+                <a:spcPts val="500"/>
+              </a:spcBef>
+              <a:buFont typeface="Arial" panose="020B0604020202020204" pitchFamily="34" charset="0"/>
+              <a:buChar char="•"/>
+              <a:defRPr sz="1800" kern="1200">
+                <a:solidFill>
+                  <a:schemeClr val="tx1"/>
+                </a:solidFill>
+                <a:latin typeface="+mn-lt"/>
+                <a:ea typeface="+mn-ea"/>
+                <a:cs typeface="+mn-cs"/>
+              </a:defRPr>
+            </a:lvl5pPr>
+            <a:lvl6pPr marL="2514600" indent="-228600" algn="l" defTabSz="914400" rtl="0" eaLnBrk="1" latinLnBrk="0" hangingPunct="1">
+              <a:lnSpc>
+                <a:spcPct val="90000"/>
+              </a:lnSpc>
+              <a:spcBef>
+                <a:spcPts val="500"/>
+              </a:spcBef>
+              <a:buFont typeface="Arial" panose="020B0604020202020204" pitchFamily="34" charset="0"/>
+              <a:buChar char="•"/>
+              <a:defRPr sz="1800" kern="1200">
+                <a:solidFill>
+                  <a:schemeClr val="tx1"/>
+                </a:solidFill>
+                <a:latin typeface="+mn-lt"/>
+                <a:ea typeface="+mn-ea"/>
+                <a:cs typeface="+mn-cs"/>
+              </a:defRPr>
+            </a:lvl6pPr>
+            <a:lvl7pPr marL="2971800" indent="-228600" algn="l" defTabSz="914400" rtl="0" eaLnBrk="1" latinLnBrk="0" hangingPunct="1">
+              <a:lnSpc>
+                <a:spcPct val="90000"/>
+              </a:lnSpc>
+              <a:spcBef>
+                <a:spcPts val="500"/>
+              </a:spcBef>
+              <a:buFont typeface="Arial" panose="020B0604020202020204" pitchFamily="34" charset="0"/>
+              <a:buChar char="•"/>
+              <a:defRPr sz="1800" kern="1200">
+                <a:solidFill>
+                  <a:schemeClr val="tx1"/>
+                </a:solidFill>
+                <a:latin typeface="+mn-lt"/>
+                <a:ea typeface="+mn-ea"/>
+                <a:cs typeface="+mn-cs"/>
+              </a:defRPr>
+            </a:lvl7pPr>
+            <a:lvl8pPr marL="3429000" indent="-228600" algn="l" defTabSz="914400" rtl="0" eaLnBrk="1" latinLnBrk="0" hangingPunct="1">
+              <a:lnSpc>
+                <a:spcPct val="90000"/>
+              </a:lnSpc>
+              <a:spcBef>
+                <a:spcPts val="500"/>
+              </a:spcBef>
+              <a:buFont typeface="Arial" panose="020B0604020202020204" pitchFamily="34" charset="0"/>
+              <a:buChar char="•"/>
+              <a:defRPr sz="1800" kern="1200">
+                <a:solidFill>
+                  <a:schemeClr val="tx1"/>
+                </a:solidFill>
+                <a:latin typeface="+mn-lt"/>
+                <a:ea typeface="+mn-ea"/>
+                <a:cs typeface="+mn-cs"/>
+              </a:defRPr>
+            </a:lvl8pPr>
+            <a:lvl9pPr marL="3886200" indent="-228600" algn="l" defTabSz="914400" rtl="0" eaLnBrk="1" latinLnBrk="0" hangingPunct="1">
+              <a:lnSpc>
+                <a:spcPct val="90000"/>
+              </a:lnSpc>
+              <a:spcBef>
+                <a:spcPts val="500"/>
+              </a:spcBef>
+              <a:buFont typeface="Arial" panose="020B0604020202020204" pitchFamily="34" charset="0"/>
+              <a:buChar char="•"/>
+              <a:defRPr sz="1800" kern="1200">
+                <a:solidFill>
+                  <a:schemeClr val="tx1"/>
+                </a:solidFill>
+                <a:latin typeface="+mn-lt"/>
+                <a:ea typeface="+mn-ea"/>
+                <a:cs typeface="+mn-cs"/>
+              </a:defRPr>
+            </a:lvl9pPr>
+          </a:lstStyle>
+          <a:p>
+            <a:pPr marL="0" indent="0">
+              <a:buFont typeface="Arial" panose="020B0604020202020204" pitchFamily="34" charset="0"/>
+              <a:buNone/>
+            </a:pPr>
+            <a:r>
+              <a:rPr lang="es-MX" sz="1100" dirty="0"/>
+              <a:t>20%</a:t>
+            </a:r>
+          </a:p>
+        </p:txBody>
+      </p:sp>
+      <p:sp>
+        <p:nvSpPr>
+          <p:cNvPr id="64" name="Marcador de contenido 2">
+            <a:extLst>
+              <a:ext uri="{FF2B5EF4-FFF2-40B4-BE49-F238E27FC236}">
+                <a16:creationId xmlns:a16="http://schemas.microsoft.com/office/drawing/2014/main" id="{98D01804-CC01-4EE1-AB35-654DF33E1FA5}"/>
+              </a:ext>
+            </a:extLst>
+          </p:cNvPr>
+          <p:cNvSpPr txBox="1">
+            <a:spLocks/>
+          </p:cNvSpPr>
+          <p:nvPr/>
+        </p:nvSpPr>
+        <p:spPr>
+          <a:xfrm>
+            <a:off x="10397208" y="124877"/>
+            <a:ext cx="498274" cy="368375"/>
+          </a:xfrm>
+          <a:prstGeom prst="rect">
+            <a:avLst/>
+          </a:prstGeom>
+        </p:spPr>
+        <p:txBody>
+          <a:bodyPr vert="horz" lIns="91440" tIns="45720" rIns="91440" bIns="45720" rtlCol="0">
+            <a:normAutofit/>
+          </a:bodyPr>
+          <a:lstStyle>
+            <a:lvl1pPr marL="228600" indent="-228600" algn="l" defTabSz="914400" rtl="0" eaLnBrk="1" latinLnBrk="0" hangingPunct="1">
+              <a:lnSpc>
+                <a:spcPct val="90000"/>
+              </a:lnSpc>
+              <a:spcBef>
+                <a:spcPts val="1000"/>
+              </a:spcBef>
+              <a:buFont typeface="Arial" panose="020B0604020202020204" pitchFamily="34" charset="0"/>
+              <a:buChar char="•"/>
+              <a:defRPr sz="2800" kern="1200">
+                <a:solidFill>
+                  <a:schemeClr val="tx1"/>
+                </a:solidFill>
+                <a:latin typeface="+mn-lt"/>
+                <a:ea typeface="+mn-ea"/>
+                <a:cs typeface="+mn-cs"/>
+              </a:defRPr>
+            </a:lvl1pPr>
+            <a:lvl2pPr marL="685800" indent="-228600" algn="l" defTabSz="914400" rtl="0" eaLnBrk="1" latinLnBrk="0" hangingPunct="1">
+              <a:lnSpc>
+                <a:spcPct val="90000"/>
+              </a:lnSpc>
+              <a:spcBef>
+                <a:spcPts val="500"/>
+              </a:spcBef>
+              <a:buFont typeface="Arial" panose="020B0604020202020204" pitchFamily="34" charset="0"/>
+              <a:buChar char="•"/>
+              <a:defRPr sz="2400" kern="1200">
+                <a:solidFill>
+                  <a:schemeClr val="tx1"/>
+                </a:solidFill>
+                <a:latin typeface="+mn-lt"/>
+                <a:ea typeface="+mn-ea"/>
+                <a:cs typeface="+mn-cs"/>
+              </a:defRPr>
+            </a:lvl2pPr>
+            <a:lvl3pPr marL="1143000" indent="-228600" algn="l" defTabSz="914400" rtl="0" eaLnBrk="1" latinLnBrk="0" hangingPunct="1">
+              <a:lnSpc>
+                <a:spcPct val="90000"/>
+              </a:lnSpc>
+              <a:spcBef>
+                <a:spcPts val="500"/>
+              </a:spcBef>
+              <a:buFont typeface="Arial" panose="020B0604020202020204" pitchFamily="34" charset="0"/>
+              <a:buChar char="•"/>
+              <a:defRPr sz="2000" kern="1200">
+                <a:solidFill>
+                  <a:schemeClr val="tx1"/>
+                </a:solidFill>
+                <a:latin typeface="+mn-lt"/>
+                <a:ea typeface="+mn-ea"/>
+                <a:cs typeface="+mn-cs"/>
+              </a:defRPr>
+            </a:lvl3pPr>
+            <a:lvl4pPr marL="1600200" indent="-228600" algn="l" defTabSz="914400" rtl="0" eaLnBrk="1" latinLnBrk="0" hangingPunct="1">
+              <a:lnSpc>
+                <a:spcPct val="90000"/>
+              </a:lnSpc>
+              <a:spcBef>
+                <a:spcPts val="500"/>
+              </a:spcBef>
+              <a:buFont typeface="Arial" panose="020B0604020202020204" pitchFamily="34" charset="0"/>
+              <a:buChar char="•"/>
+              <a:defRPr sz="1800" kern="1200">
+                <a:solidFill>
+                  <a:schemeClr val="tx1"/>
+                </a:solidFill>
+                <a:latin typeface="+mn-lt"/>
+                <a:ea typeface="+mn-ea"/>
+                <a:cs typeface="+mn-cs"/>
+              </a:defRPr>
+            </a:lvl4pPr>
+            <a:lvl5pPr marL="2057400" indent="-228600" algn="l" defTabSz="914400" rtl="0" eaLnBrk="1" latinLnBrk="0" hangingPunct="1">
+              <a:lnSpc>
+                <a:spcPct val="90000"/>
+              </a:lnSpc>
+              <a:spcBef>
+                <a:spcPts val="500"/>
+              </a:spcBef>
+              <a:buFont typeface="Arial" panose="020B0604020202020204" pitchFamily="34" charset="0"/>
+              <a:buChar char="•"/>
+              <a:defRPr sz="1800" kern="1200">
+                <a:solidFill>
+                  <a:schemeClr val="tx1"/>
+                </a:solidFill>
+                <a:latin typeface="+mn-lt"/>
+                <a:ea typeface="+mn-ea"/>
+                <a:cs typeface="+mn-cs"/>
+              </a:defRPr>
+            </a:lvl5pPr>
+            <a:lvl6pPr marL="2514600" indent="-228600" algn="l" defTabSz="914400" rtl="0" eaLnBrk="1" latinLnBrk="0" hangingPunct="1">
+              <a:lnSpc>
+                <a:spcPct val="90000"/>
+              </a:lnSpc>
+              <a:spcBef>
+                <a:spcPts val="500"/>
+              </a:spcBef>
+              <a:buFont typeface="Arial" panose="020B0604020202020204" pitchFamily="34" charset="0"/>
+              <a:buChar char="•"/>
+              <a:defRPr sz="1800" kern="1200">
+                <a:solidFill>
+                  <a:schemeClr val="tx1"/>
+                </a:solidFill>
+                <a:latin typeface="+mn-lt"/>
+                <a:ea typeface="+mn-ea"/>
+                <a:cs typeface="+mn-cs"/>
+              </a:defRPr>
+            </a:lvl6pPr>
+            <a:lvl7pPr marL="2971800" indent="-228600" algn="l" defTabSz="914400" rtl="0" eaLnBrk="1" latinLnBrk="0" hangingPunct="1">
+              <a:lnSpc>
+                <a:spcPct val="90000"/>
+              </a:lnSpc>
+              <a:spcBef>
+                <a:spcPts val="500"/>
+              </a:spcBef>
+              <a:buFont typeface="Arial" panose="020B0604020202020204" pitchFamily="34" charset="0"/>
+              <a:buChar char="•"/>
+              <a:defRPr sz="1800" kern="1200">
+                <a:solidFill>
+                  <a:schemeClr val="tx1"/>
+                </a:solidFill>
+                <a:latin typeface="+mn-lt"/>
+                <a:ea typeface="+mn-ea"/>
+                <a:cs typeface="+mn-cs"/>
+              </a:defRPr>
+            </a:lvl7pPr>
+            <a:lvl8pPr marL="3429000" indent="-228600" algn="l" defTabSz="914400" rtl="0" eaLnBrk="1" latinLnBrk="0" hangingPunct="1">
+              <a:lnSpc>
+                <a:spcPct val="90000"/>
+              </a:lnSpc>
+              <a:spcBef>
+                <a:spcPts val="500"/>
+              </a:spcBef>
+              <a:buFont typeface="Arial" panose="020B0604020202020204" pitchFamily="34" charset="0"/>
+              <a:buChar char="•"/>
+              <a:defRPr sz="1800" kern="1200">
+                <a:solidFill>
+                  <a:schemeClr val="tx1"/>
+                </a:solidFill>
+                <a:latin typeface="+mn-lt"/>
+                <a:ea typeface="+mn-ea"/>
+                <a:cs typeface="+mn-cs"/>
+              </a:defRPr>
+            </a:lvl8pPr>
+            <a:lvl9pPr marL="3886200" indent="-228600" algn="l" defTabSz="914400" rtl="0" eaLnBrk="1" latinLnBrk="0" hangingPunct="1">
+              <a:lnSpc>
+                <a:spcPct val="90000"/>
+              </a:lnSpc>
+              <a:spcBef>
+                <a:spcPts val="500"/>
+              </a:spcBef>
+              <a:buFont typeface="Arial" panose="020B0604020202020204" pitchFamily="34" charset="0"/>
+              <a:buChar char="•"/>
+              <a:defRPr sz="1800" kern="1200">
+                <a:solidFill>
+                  <a:schemeClr val="tx1"/>
+                </a:solidFill>
+                <a:latin typeface="+mn-lt"/>
+                <a:ea typeface="+mn-ea"/>
+                <a:cs typeface="+mn-cs"/>
+              </a:defRPr>
+            </a:lvl9pPr>
+          </a:lstStyle>
+          <a:p>
+            <a:pPr marL="0" indent="0">
+              <a:buFont typeface="Arial" panose="020B0604020202020204" pitchFamily="34" charset="0"/>
+              <a:buNone/>
+            </a:pPr>
+            <a:r>
+              <a:rPr lang="es-MX" sz="1050" dirty="0"/>
+              <a:t>10%</a:t>
+            </a:r>
+          </a:p>
+        </p:txBody>
+      </p:sp>
+      <p:sp>
+        <p:nvSpPr>
+          <p:cNvPr id="32" name="Marcador de contenido 2">
+            <a:extLst>
+              <a:ext uri="{FF2B5EF4-FFF2-40B4-BE49-F238E27FC236}">
+                <a16:creationId xmlns:a16="http://schemas.microsoft.com/office/drawing/2014/main" id="{7DE68700-22CF-43C5-943C-9E6992C3E629}"/>
+              </a:ext>
+            </a:extLst>
+          </p:cNvPr>
+          <p:cNvSpPr txBox="1">
+            <a:spLocks/>
+          </p:cNvSpPr>
+          <p:nvPr/>
+        </p:nvSpPr>
+        <p:spPr>
+          <a:xfrm>
+            <a:off x="11345480" y="615749"/>
+            <a:ext cx="150888" cy="349398"/>
+          </a:xfrm>
+          <a:prstGeom prst="rect">
+            <a:avLst/>
+          </a:prstGeom>
+        </p:spPr>
+        <p:txBody>
+          <a:bodyPr vert="horz" lIns="91440" tIns="45720" rIns="91440" bIns="45720" rtlCol="0">
+            <a:normAutofit/>
+          </a:bodyPr>
+          <a:lstStyle>
+            <a:lvl1pPr marL="228600" indent="-228600" algn="l" defTabSz="914400" rtl="0" eaLnBrk="1" latinLnBrk="0" hangingPunct="1">
+              <a:lnSpc>
+                <a:spcPct val="90000"/>
+              </a:lnSpc>
+              <a:spcBef>
+                <a:spcPts val="1000"/>
+              </a:spcBef>
+              <a:buFont typeface="Arial" panose="020B0604020202020204" pitchFamily="34" charset="0"/>
+              <a:buChar char="•"/>
+              <a:defRPr sz="2800" kern="1200">
+                <a:solidFill>
+                  <a:schemeClr val="tx1"/>
+                </a:solidFill>
+                <a:latin typeface="+mn-lt"/>
+                <a:ea typeface="+mn-ea"/>
+                <a:cs typeface="+mn-cs"/>
+              </a:defRPr>
+            </a:lvl1pPr>
+            <a:lvl2pPr marL="685800" indent="-228600" algn="l" defTabSz="914400" rtl="0" eaLnBrk="1" latinLnBrk="0" hangingPunct="1">
+              <a:lnSpc>
+                <a:spcPct val="90000"/>
+              </a:lnSpc>
+              <a:spcBef>
+                <a:spcPts val="500"/>
+              </a:spcBef>
+              <a:buFont typeface="Arial" panose="020B0604020202020204" pitchFamily="34" charset="0"/>
+              <a:buChar char="•"/>
+              <a:defRPr sz="2400" kern="1200">
+                <a:solidFill>
+                  <a:schemeClr val="tx1"/>
+                </a:solidFill>
+                <a:latin typeface="+mn-lt"/>
+                <a:ea typeface="+mn-ea"/>
+                <a:cs typeface="+mn-cs"/>
+              </a:defRPr>
+            </a:lvl2pPr>
+            <a:lvl3pPr marL="1143000" indent="-228600" algn="l" defTabSz="914400" rtl="0" eaLnBrk="1" latinLnBrk="0" hangingPunct="1">
+              <a:lnSpc>
+                <a:spcPct val="90000"/>
+              </a:lnSpc>
+              <a:spcBef>
+                <a:spcPts val="500"/>
+              </a:spcBef>
+              <a:buFont typeface="Arial" panose="020B0604020202020204" pitchFamily="34" charset="0"/>
+              <a:buChar char="•"/>
+              <a:defRPr sz="2000" kern="1200">
+                <a:solidFill>
+                  <a:schemeClr val="tx1"/>
+                </a:solidFill>
+                <a:latin typeface="+mn-lt"/>
+                <a:ea typeface="+mn-ea"/>
+                <a:cs typeface="+mn-cs"/>
+              </a:defRPr>
+            </a:lvl3pPr>
+            <a:lvl4pPr marL="1600200" indent="-228600" algn="l" defTabSz="914400" rtl="0" eaLnBrk="1" latinLnBrk="0" hangingPunct="1">
+              <a:lnSpc>
+                <a:spcPct val="90000"/>
+              </a:lnSpc>
+              <a:spcBef>
+                <a:spcPts val="500"/>
+              </a:spcBef>
+              <a:buFont typeface="Arial" panose="020B0604020202020204" pitchFamily="34" charset="0"/>
+              <a:buChar char="•"/>
+              <a:defRPr sz="1800" kern="1200">
+                <a:solidFill>
+                  <a:schemeClr val="tx1"/>
+                </a:solidFill>
+                <a:latin typeface="+mn-lt"/>
+                <a:ea typeface="+mn-ea"/>
+                <a:cs typeface="+mn-cs"/>
+              </a:defRPr>
+            </a:lvl4pPr>
+            <a:lvl5pPr marL="2057400" indent="-228600" algn="l" defTabSz="914400" rtl="0" eaLnBrk="1" latinLnBrk="0" hangingPunct="1">
+              <a:lnSpc>
+                <a:spcPct val="90000"/>
+              </a:lnSpc>
+              <a:spcBef>
+                <a:spcPts val="500"/>
+              </a:spcBef>
+              <a:buFont typeface="Arial" panose="020B0604020202020204" pitchFamily="34" charset="0"/>
+              <a:buChar char="•"/>
+              <a:defRPr sz="1800" kern="1200">
+                <a:solidFill>
+                  <a:schemeClr val="tx1"/>
+                </a:solidFill>
+                <a:latin typeface="+mn-lt"/>
+                <a:ea typeface="+mn-ea"/>
+                <a:cs typeface="+mn-cs"/>
+              </a:defRPr>
+            </a:lvl5pPr>
+            <a:lvl6pPr marL="2514600" indent="-228600" algn="l" defTabSz="914400" rtl="0" eaLnBrk="1" latinLnBrk="0" hangingPunct="1">
+              <a:lnSpc>
+                <a:spcPct val="90000"/>
+              </a:lnSpc>
+              <a:spcBef>
+                <a:spcPts val="500"/>
+              </a:spcBef>
+              <a:buFont typeface="Arial" panose="020B0604020202020204" pitchFamily="34" charset="0"/>
+              <a:buChar char="•"/>
+              <a:defRPr sz="1800" kern="1200">
+                <a:solidFill>
+                  <a:schemeClr val="tx1"/>
+                </a:solidFill>
+                <a:latin typeface="+mn-lt"/>
+                <a:ea typeface="+mn-ea"/>
+                <a:cs typeface="+mn-cs"/>
+              </a:defRPr>
+            </a:lvl6pPr>
+            <a:lvl7pPr marL="2971800" indent="-228600" algn="l" defTabSz="914400" rtl="0" eaLnBrk="1" latinLnBrk="0" hangingPunct="1">
+              <a:lnSpc>
+                <a:spcPct val="90000"/>
+              </a:lnSpc>
+              <a:spcBef>
+                <a:spcPts val="500"/>
+              </a:spcBef>
+              <a:buFont typeface="Arial" panose="020B0604020202020204" pitchFamily="34" charset="0"/>
+              <a:buChar char="•"/>
+              <a:defRPr sz="1800" kern="1200">
+                <a:solidFill>
+                  <a:schemeClr val="tx1"/>
+                </a:solidFill>
+                <a:latin typeface="+mn-lt"/>
+                <a:ea typeface="+mn-ea"/>
+                <a:cs typeface="+mn-cs"/>
+              </a:defRPr>
+            </a:lvl7pPr>
+            <a:lvl8pPr marL="3429000" indent="-228600" algn="l" defTabSz="914400" rtl="0" eaLnBrk="1" latinLnBrk="0" hangingPunct="1">
+              <a:lnSpc>
+                <a:spcPct val="90000"/>
+              </a:lnSpc>
+              <a:spcBef>
+                <a:spcPts val="500"/>
+              </a:spcBef>
+              <a:buFont typeface="Arial" panose="020B0604020202020204" pitchFamily="34" charset="0"/>
+              <a:buChar char="•"/>
+              <a:defRPr sz="1800" kern="1200">
+                <a:solidFill>
+                  <a:schemeClr val="tx1"/>
+                </a:solidFill>
+                <a:latin typeface="+mn-lt"/>
+                <a:ea typeface="+mn-ea"/>
+                <a:cs typeface="+mn-cs"/>
+              </a:defRPr>
+            </a:lvl8pPr>
+            <a:lvl9pPr marL="3886200" indent="-228600" algn="l" defTabSz="914400" rtl="0" eaLnBrk="1" latinLnBrk="0" hangingPunct="1">
+              <a:lnSpc>
+                <a:spcPct val="90000"/>
+              </a:lnSpc>
+              <a:spcBef>
+                <a:spcPts val="500"/>
+              </a:spcBef>
+              <a:buFont typeface="Arial" panose="020B0604020202020204" pitchFamily="34" charset="0"/>
+              <a:buChar char="•"/>
+              <a:defRPr sz="1800" kern="1200">
+                <a:solidFill>
+                  <a:schemeClr val="tx1"/>
+                </a:solidFill>
+                <a:latin typeface="+mn-lt"/>
+                <a:ea typeface="+mn-ea"/>
+                <a:cs typeface="+mn-cs"/>
+              </a:defRPr>
+            </a:lvl9pPr>
+          </a:lstStyle>
+          <a:p>
+            <a:pPr marL="0" indent="0">
+              <a:buFont typeface="Arial" panose="020B0604020202020204" pitchFamily="34" charset="0"/>
+              <a:buNone/>
+            </a:pPr>
+            <a:r>
+              <a:rPr lang="es-MX" sz="1800" dirty="0"/>
+              <a:t>%</a:t>
+            </a:r>
           </a:p>
         </p:txBody>
       </p:sp>

</xml_diff>